<commit_message>
Add instruction about how to assign a buffer to a rawdata object
git-svn-id: https://belle2.cc.kek.jp/svn/trunk/software@12159 b38c6c8f-bee8-465d-8448-9abe6915d496
</commit_message>
<xml_diff>
--- a/daq/copper/doc/SetupPocketDAQ_4p5_RawDataUnpackerPacker.pptx
+++ b/daq/copper/doc/SetupPocketDAQ_4p5_RawDataUnpackerPacker.pptx
@@ -9,11 +9,12 @@
     <p:sldId id="259" r:id="rId3"/>
     <p:sldId id="257" r:id="rId4"/>
     <p:sldId id="258" r:id="rId5"/>
-    <p:sldId id="260" r:id="rId6"/>
-    <p:sldId id="261" r:id="rId7"/>
-    <p:sldId id="262" r:id="rId8"/>
-    <p:sldId id="263" r:id="rId9"/>
-    <p:sldId id="264" r:id="rId10"/>
+    <p:sldId id="265" r:id="rId6"/>
+    <p:sldId id="260" r:id="rId7"/>
+    <p:sldId id="261" r:id="rId8"/>
+    <p:sldId id="262" r:id="rId9"/>
+    <p:sldId id="263" r:id="rId10"/>
+    <p:sldId id="264" r:id="rId11"/>
   </p:sldIdLst>
   <p:sldSz cx="12192000" cy="6858000"/>
   <p:notesSz cx="6858000" cy="9144000"/>
@@ -251,7 +252,7 @@
           <a:p>
             <a:fld id="{7C5129ED-FA21-4495-B7FB-D7C185F19D83}" type="datetimeFigureOut">
               <a:rPr kumimoji="1" lang="ja-JP" altLang="en-US" smtClean="0"/>
-              <a:t>2014/7/15</a:t>
+              <a:t>2014/8/8</a:t>
             </a:fld>
             <a:endParaRPr kumimoji="1" lang="ja-JP" altLang="en-US"/>
           </a:p>
@@ -453,7 +454,7 @@
           <a:p>
             <a:fld id="{7C5129ED-FA21-4495-B7FB-D7C185F19D83}" type="datetimeFigureOut">
               <a:rPr kumimoji="1" lang="ja-JP" altLang="en-US" smtClean="0"/>
-              <a:t>2014/7/15</a:t>
+              <a:t>2014/8/8</a:t>
             </a:fld>
             <a:endParaRPr kumimoji="1" lang="ja-JP" altLang="en-US"/>
           </a:p>
@@ -665,7 +666,7 @@
           <a:p>
             <a:fld id="{7C5129ED-FA21-4495-B7FB-D7C185F19D83}" type="datetimeFigureOut">
               <a:rPr kumimoji="1" lang="ja-JP" altLang="en-US" smtClean="0"/>
-              <a:t>2014/7/15</a:t>
+              <a:t>2014/8/8</a:t>
             </a:fld>
             <a:endParaRPr kumimoji="1" lang="ja-JP" altLang="en-US"/>
           </a:p>
@@ -867,7 +868,7 @@
           <a:p>
             <a:fld id="{7C5129ED-FA21-4495-B7FB-D7C185F19D83}" type="datetimeFigureOut">
               <a:rPr kumimoji="1" lang="ja-JP" altLang="en-US" smtClean="0"/>
-              <a:t>2014/7/15</a:t>
+              <a:t>2014/8/8</a:t>
             </a:fld>
             <a:endParaRPr kumimoji="1" lang="ja-JP" altLang="en-US"/>
           </a:p>
@@ -1113,7 +1114,7 @@
           <a:p>
             <a:fld id="{7C5129ED-FA21-4495-B7FB-D7C185F19D83}" type="datetimeFigureOut">
               <a:rPr kumimoji="1" lang="ja-JP" altLang="en-US" smtClean="0"/>
-              <a:t>2014/7/15</a:t>
+              <a:t>2014/8/8</a:t>
             </a:fld>
             <a:endParaRPr kumimoji="1" lang="ja-JP" altLang="en-US"/>
           </a:p>
@@ -1409,7 +1410,7 @@
           <a:p>
             <a:fld id="{7C5129ED-FA21-4495-B7FB-D7C185F19D83}" type="datetimeFigureOut">
               <a:rPr kumimoji="1" lang="ja-JP" altLang="en-US" smtClean="0"/>
-              <a:t>2014/7/15</a:t>
+              <a:t>2014/8/8</a:t>
             </a:fld>
             <a:endParaRPr kumimoji="1" lang="ja-JP" altLang="en-US"/>
           </a:p>
@@ -1840,7 +1841,7 @@
           <a:p>
             <a:fld id="{7C5129ED-FA21-4495-B7FB-D7C185F19D83}" type="datetimeFigureOut">
               <a:rPr kumimoji="1" lang="ja-JP" altLang="en-US" smtClean="0"/>
-              <a:t>2014/7/15</a:t>
+              <a:t>2014/8/8</a:t>
             </a:fld>
             <a:endParaRPr kumimoji="1" lang="ja-JP" altLang="en-US"/>
           </a:p>
@@ -1958,7 +1959,7 @@
           <a:p>
             <a:fld id="{7C5129ED-FA21-4495-B7FB-D7C185F19D83}" type="datetimeFigureOut">
               <a:rPr kumimoji="1" lang="ja-JP" altLang="en-US" smtClean="0"/>
-              <a:t>2014/7/15</a:t>
+              <a:t>2014/8/8</a:t>
             </a:fld>
             <a:endParaRPr kumimoji="1" lang="ja-JP" altLang="en-US"/>
           </a:p>
@@ -2053,7 +2054,7 @@
           <a:p>
             <a:fld id="{7C5129ED-FA21-4495-B7FB-D7C185F19D83}" type="datetimeFigureOut">
               <a:rPr kumimoji="1" lang="ja-JP" altLang="en-US" smtClean="0"/>
-              <a:t>2014/7/15</a:t>
+              <a:t>2014/8/8</a:t>
             </a:fld>
             <a:endParaRPr kumimoji="1" lang="ja-JP" altLang="en-US"/>
           </a:p>
@@ -2362,7 +2363,7 @@
           <a:p>
             <a:fld id="{7C5129ED-FA21-4495-B7FB-D7C185F19D83}" type="datetimeFigureOut">
               <a:rPr kumimoji="1" lang="ja-JP" altLang="en-US" smtClean="0"/>
-              <a:t>2014/7/15</a:t>
+              <a:t>2014/8/8</a:t>
             </a:fld>
             <a:endParaRPr kumimoji="1" lang="ja-JP" altLang="en-US"/>
           </a:p>
@@ -2615,7 +2616,7 @@
           <a:p>
             <a:fld id="{7C5129ED-FA21-4495-B7FB-D7C185F19D83}" type="datetimeFigureOut">
               <a:rPr kumimoji="1" lang="ja-JP" altLang="en-US" smtClean="0"/>
-              <a:t>2014/7/15</a:t>
+              <a:t>2014/8/8</a:t>
             </a:fld>
             <a:endParaRPr kumimoji="1" lang="ja-JP" altLang="en-US"/>
           </a:p>
@@ -2860,7 +2861,7 @@
           <a:p>
             <a:fld id="{7C5129ED-FA21-4495-B7FB-D7C185F19D83}" type="datetimeFigureOut">
               <a:rPr kumimoji="1" lang="ja-JP" altLang="en-US" smtClean="0"/>
-              <a:t>2014/7/15</a:t>
+              <a:t>2014/8/8</a:t>
             </a:fld>
             <a:endParaRPr kumimoji="1" lang="ja-JP" altLang="en-US"/>
           </a:p>
@@ -3286,11 +3287,7 @@
             </a:r>
             <a:r>
               <a:rPr kumimoji="1" lang="en-US" altLang="ja-JP" dirty="0" smtClean="0"/>
-              <a:t> unpacker and </a:t>
-            </a:r>
-            <a:r>
-              <a:rPr kumimoji="1" lang="en-US" altLang="ja-JP" dirty="0" smtClean="0"/>
-              <a:t>packer</a:t>
+              <a:t> unpacker and packer</a:t>
             </a:r>
             <a:endParaRPr kumimoji="1" lang="ja-JP" altLang="en-US" dirty="0"/>
           </a:p>
@@ -3320,11 +3317,19 @@
           <a:p>
             <a:r>
               <a:rPr kumimoji="1" lang="en-US" altLang="ja-JP" sz="2400" dirty="0" smtClean="0"/>
-              <a:t>July 15, 2014 </a:t>
+              <a:t>Aug. 8, </a:t>
+            </a:r>
+            <a:r>
+              <a:rPr kumimoji="1" lang="en-US" altLang="ja-JP" sz="2400" dirty="0" smtClean="0"/>
+              <a:t>2014 </a:t>
             </a:r>
             <a:r>
               <a:rPr lang="en-US" altLang="ja-JP" sz="2400" dirty="0"/>
-              <a:t>(SVN rev.11616)</a:t>
+              <a:t>(SVN </a:t>
+            </a:r>
+            <a:r>
+              <a:rPr lang="en-US" altLang="ja-JP" sz="2400" dirty="0" smtClean="0"/>
+              <a:t>rev. 12158)</a:t>
             </a:r>
             <a:endParaRPr lang="ja-JP" altLang="en-US" sz="2400" dirty="0"/>
           </a:p>
@@ -3344,6 +3349,109 @@
     <p:extLst>
       <p:ext uri="{BB962C8B-B14F-4D97-AF65-F5344CB8AC3E}">
         <p14:creationId xmlns:p14="http://schemas.microsoft.com/office/powerpoint/2010/main" val="3145161335"/>
+      </p:ext>
+    </p:extLst>
+  </p:cSld>
+  <p:clrMapOvr>
+    <a:masterClrMapping/>
+  </p:clrMapOvr>
+</p:sld>
+</file>
+
+<file path=ppt/slides/slide10.xml><?xml version="1.0" encoding="utf-8"?>
+<p:sld xmlns:a="http://schemas.openxmlformats.org/drawingml/2006/main" xmlns:r="http://schemas.openxmlformats.org/officeDocument/2006/relationships" xmlns:p="http://schemas.openxmlformats.org/presentationml/2006/main">
+  <p:cSld>
+    <p:spTree>
+      <p:nvGrpSpPr>
+        <p:cNvPr id="1" name=""/>
+        <p:cNvGrpSpPr/>
+        <p:nvPr/>
+      </p:nvGrpSpPr>
+      <p:grpSpPr>
+        <a:xfrm>
+          <a:off x="0" y="0"/>
+          <a:ext cx="0" cy="0"/>
+          <a:chOff x="0" y="0"/>
+          <a:chExt cx="0" cy="0"/>
+        </a:xfrm>
+      </p:grpSpPr>
+      <p:sp>
+        <p:nvSpPr>
+          <p:cNvPr id="2" name="タイトル 1"/>
+          <p:cNvSpPr>
+            <a:spLocks noGrp="1"/>
+          </p:cNvSpPr>
+          <p:nvPr>
+            <p:ph type="title"/>
+          </p:nvPr>
+        </p:nvSpPr>
+        <p:spPr>
+          <a:xfrm>
+            <a:off x="412173" y="114300"/>
+            <a:ext cx="10515600" cy="828243"/>
+          </a:xfrm>
+        </p:spPr>
+        <p:txBody>
+          <a:bodyPr/>
+          <a:lstStyle/>
+          <a:p>
+            <a:r>
+              <a:rPr kumimoji="1" lang="en-US" altLang="ja-JP" u="sng" dirty="0" smtClean="0"/>
+              <a:t>Revision history</a:t>
+            </a:r>
+            <a:endParaRPr kumimoji="1" lang="ja-JP" altLang="en-US" u="sng" dirty="0"/>
+          </a:p>
+        </p:txBody>
+      </p:sp>
+      <p:sp>
+        <p:nvSpPr>
+          <p:cNvPr id="3" name="コンテンツ プレースホルダー 2"/>
+          <p:cNvSpPr>
+            <a:spLocks noGrp="1"/>
+          </p:cNvSpPr>
+          <p:nvPr>
+            <p:ph idx="1"/>
+          </p:nvPr>
+        </p:nvSpPr>
+        <p:spPr/>
+        <p:txBody>
+          <a:bodyPr/>
+          <a:lstStyle/>
+          <a:p>
+            <a:r>
+              <a:rPr kumimoji="1" lang="en-US" altLang="ja-JP" dirty="0" smtClean="0"/>
+              <a:t>July 15, </a:t>
+            </a:r>
+            <a:r>
+              <a:rPr kumimoji="1" lang="en-US" altLang="ja-JP" dirty="0" smtClean="0"/>
+              <a:t>2014 </a:t>
+            </a:r>
+            <a:r>
+              <a:rPr kumimoji="1" lang="en-US" altLang="ja-JP" dirty="0" smtClean="0"/>
+              <a:t>(rev.11616) : ver.1 </a:t>
+            </a:r>
+            <a:endParaRPr kumimoji="1" lang="en-US" altLang="ja-JP" dirty="0" smtClean="0"/>
+          </a:p>
+          <a:p>
+            <a:r>
+              <a:rPr lang="en-US" altLang="ja-JP" dirty="0" smtClean="0"/>
+              <a:t>Aug. 8, 2014 (rev. 12158) </a:t>
+            </a:r>
+          </a:p>
+          <a:p>
+            <a:pPr lvl="1"/>
+            <a:r>
+              <a:rPr kumimoji="1" lang="en-US" altLang="ja-JP" dirty="0" smtClean="0"/>
+              <a:t>Add instruction about setting a buffer to Raw*** object.</a:t>
+            </a:r>
+            <a:endParaRPr kumimoji="1" lang="ja-JP" altLang="en-US" dirty="0"/>
+          </a:p>
+        </p:txBody>
+      </p:sp>
+    </p:spTree>
+    <p:extLst>
+      <p:ext uri="{BB962C8B-B14F-4D97-AF65-F5344CB8AC3E}">
+        <p14:creationId xmlns:p14="http://schemas.microsoft.com/office/powerpoint/2010/main" val="3152965117"/>
       </p:ext>
     </p:extLst>
   </p:cSld>
@@ -5274,61 +5382,675 @@
       </p:grpSpPr>
       <p:sp>
         <p:nvSpPr>
-          <p:cNvPr id="4" name="タイトル 1"/>
-          <p:cNvSpPr txBox="1">
-            <a:spLocks/>
+          <p:cNvPr id="2" name="タイトル 1"/>
+          <p:cNvSpPr>
+            <a:spLocks noGrp="1"/>
           </p:cNvSpPr>
-          <p:nvPr/>
+          <p:nvPr>
+            <p:ph type="title"/>
+          </p:nvPr>
         </p:nvSpPr>
         <p:spPr>
           <a:xfrm>
-            <a:off x="4495801" y="2309835"/>
-            <a:ext cx="3901225" cy="1325563"/>
+            <a:off x="0" y="0"/>
+            <a:ext cx="10515600" cy="614363"/>
           </a:xfrm>
-          <a:prstGeom prst="rect">
-            <a:avLst/>
-          </a:prstGeom>
         </p:spPr>
         <p:txBody>
-          <a:bodyPr vert="horz" lIns="91440" tIns="45720" rIns="91440" bIns="45720" rtlCol="0" anchor="ctr">
+          <a:bodyPr>
+            <a:normAutofit fontScale="90000"/>
+          </a:bodyPr>
+          <a:lstStyle/>
+          <a:p>
+            <a:r>
+              <a:rPr kumimoji="1" lang="en-US" altLang="ja-JP" sz="3200" u="sng" dirty="0" smtClean="0"/>
+              <a:t>1-3, How to assign a buffer to </a:t>
+            </a:r>
+            <a:r>
+              <a:rPr kumimoji="1" lang="en-US" altLang="ja-JP" sz="3200" u="sng" dirty="0" err="1" smtClean="0"/>
+              <a:t>RawDataBlock</a:t>
+            </a:r>
+            <a:r>
+              <a:rPr kumimoji="1" lang="en-US" altLang="ja-JP" sz="3200" u="sng" dirty="0" smtClean="0"/>
+              <a:t>, </a:t>
+            </a:r>
+            <a:r>
+              <a:rPr kumimoji="1" lang="en-US" altLang="ja-JP" sz="3200" u="sng" dirty="0" err="1" smtClean="0"/>
+              <a:t>RawCOPPER</a:t>
+            </a:r>
+            <a:r>
+              <a:rPr kumimoji="1" lang="en-US" altLang="ja-JP" sz="3200" u="sng" dirty="0" smtClean="0"/>
+              <a:t>, </a:t>
+            </a:r>
+            <a:r>
+              <a:rPr kumimoji="1" lang="en-US" altLang="ja-JP" sz="3200" u="sng" dirty="0" err="1" smtClean="0"/>
+              <a:t>RawSVD</a:t>
+            </a:r>
+            <a:r>
+              <a:rPr kumimoji="1" lang="en-US" altLang="ja-JP" sz="3200" u="sng" dirty="0" smtClean="0"/>
+              <a:t>… </a:t>
+            </a:r>
+            <a:endParaRPr kumimoji="1" lang="ja-JP" altLang="en-US" sz="3200" u="sng" dirty="0"/>
+          </a:p>
+        </p:txBody>
+      </p:sp>
+      <p:sp>
+        <p:nvSpPr>
+          <p:cNvPr id="3" name="コンテンツ プレースホルダー 2"/>
+          <p:cNvSpPr>
+            <a:spLocks noGrp="1"/>
+          </p:cNvSpPr>
+          <p:nvPr>
+            <p:ph idx="1"/>
+          </p:nvPr>
+        </p:nvSpPr>
+        <p:spPr>
+          <a:xfrm>
+            <a:off x="474519" y="994351"/>
+            <a:ext cx="10515600" cy="5094721"/>
+          </a:xfrm>
+        </p:spPr>
+        <p:txBody>
+          <a:bodyPr>
             <a:normAutofit/>
           </a:bodyPr>
-          <a:lstStyle>
-            <a:lvl1pPr algn="l" defTabSz="914400" rtl="0" eaLnBrk="1" latinLnBrk="0" hangingPunct="1">
-              <a:lnSpc>
-                <a:spcPct val="90000"/>
-              </a:lnSpc>
-              <a:spcBef>
-                <a:spcPct val="0"/>
-              </a:spcBef>
-              <a:buNone/>
-              <a:defRPr kumimoji="1" sz="4400" kern="1200">
-                <a:solidFill>
-                  <a:schemeClr val="tx1"/>
-                </a:solidFill>
-                <a:latin typeface="+mj-lt"/>
-                <a:ea typeface="+mj-ea"/>
-                <a:cs typeface="+mj-cs"/>
-              </a:defRPr>
-            </a:lvl1pPr>
-          </a:lstStyle>
-          <a:p>
-            <a:r>
-              <a:rPr lang="en-US" altLang="ja-JP" dirty="0"/>
-              <a:t>2</a:t>
-            </a:r>
-            <a:r>
-              <a:rPr lang="en-US" altLang="ja-JP" dirty="0" smtClean="0"/>
-              <a:t>, Packer</a:t>
-            </a:r>
-            <a:endParaRPr lang="ja-JP" altLang="en-US" dirty="0"/>
+          <a:lstStyle/>
+          <a:p>
+            <a:pPr marL="0" indent="0">
+              <a:buNone/>
+            </a:pPr>
+            <a:r>
+              <a:rPr kumimoji="1" lang="en-US" altLang="ja-JP" sz="1400" dirty="0" err="1" smtClean="0"/>
+              <a:t>int</a:t>
+            </a:r>
+            <a:r>
+              <a:rPr lang="en-US" altLang="ja-JP" sz="1400" dirty="0" smtClean="0"/>
+              <a:t>* buffer = new </a:t>
+            </a:r>
+            <a:r>
+              <a:rPr lang="en-US" altLang="ja-JP" sz="1400" dirty="0" err="1" smtClean="0"/>
+              <a:t>int</a:t>
+            </a:r>
+            <a:r>
+              <a:rPr lang="en-US" altLang="ja-JP" sz="1400" dirty="0" smtClean="0"/>
+              <a:t>[</a:t>
+            </a:r>
+            <a:r>
+              <a:rPr lang="en-US" altLang="ja-JP" sz="1400" dirty="0" err="1" smtClean="0"/>
+              <a:t>nwords</a:t>
+            </a:r>
+            <a:r>
+              <a:rPr lang="en-US" altLang="ja-JP" sz="1400" dirty="0" smtClean="0"/>
+              <a:t>];   // data </a:t>
+            </a:r>
+          </a:p>
+          <a:p>
+            <a:pPr marL="0" indent="0">
+              <a:buNone/>
+            </a:pPr>
+            <a:r>
+              <a:rPr lang="en-US" altLang="ja-JP" sz="1400" dirty="0" err="1" smtClean="0"/>
+              <a:t>RawCOPPER</a:t>
+            </a:r>
+            <a:r>
+              <a:rPr lang="en-US" altLang="ja-JP" sz="1400" dirty="0" smtClean="0"/>
+              <a:t> </a:t>
+            </a:r>
+            <a:r>
+              <a:rPr lang="en-US" altLang="ja-JP" sz="1400" dirty="0" err="1" smtClean="0"/>
+              <a:t>raw_copper</a:t>
+            </a:r>
+            <a:r>
+              <a:rPr lang="en-US" altLang="ja-JP" sz="1400" dirty="0" smtClean="0"/>
+              <a:t>; </a:t>
+            </a:r>
+          </a:p>
+          <a:p>
+            <a:pPr marL="0" indent="0">
+              <a:buNone/>
+            </a:pPr>
+            <a:r>
+              <a:rPr lang="en-US" altLang="ja-JP" sz="1400" dirty="0" err="1" smtClean="0"/>
+              <a:t>Int</a:t>
+            </a:r>
+            <a:r>
+              <a:rPr lang="en-US" altLang="ja-JP" sz="1400" dirty="0" smtClean="0"/>
+              <a:t> </a:t>
+            </a:r>
+            <a:r>
+              <a:rPr lang="en-US" altLang="ja-JP" sz="1400" dirty="0" err="1" smtClean="0"/>
+              <a:t>delete_flag</a:t>
+            </a:r>
+            <a:r>
+              <a:rPr lang="en-US" altLang="ja-JP" sz="1400" dirty="0" smtClean="0"/>
+              <a:t> = 1;  // if 1, </a:t>
+            </a:r>
+            <a:r>
+              <a:rPr lang="en-US" altLang="ja-JP" sz="1400" dirty="0" err="1" smtClean="0"/>
+              <a:t>raw_copper’s</a:t>
+            </a:r>
+            <a:r>
+              <a:rPr lang="en-US" altLang="ja-JP" sz="1400" dirty="0" smtClean="0"/>
+              <a:t> destructor will call “delete buffer;”</a:t>
+            </a:r>
+          </a:p>
+          <a:p>
+            <a:pPr marL="0" indent="0">
+              <a:buNone/>
+            </a:pPr>
+            <a:r>
+              <a:rPr lang="en-US" altLang="ja-JP" sz="1400" dirty="0" err="1" smtClean="0"/>
+              <a:t>Int</a:t>
+            </a:r>
+            <a:r>
+              <a:rPr lang="en-US" altLang="ja-JP" sz="1400" dirty="0" smtClean="0"/>
+              <a:t> </a:t>
+            </a:r>
+            <a:r>
+              <a:rPr lang="en-US" altLang="ja-JP" sz="1400" dirty="0" err="1" smtClean="0"/>
+              <a:t>num_event</a:t>
+            </a:r>
+            <a:r>
+              <a:rPr lang="en-US" altLang="ja-JP" sz="1400" dirty="0" smtClean="0"/>
+              <a:t> = 1, </a:t>
+            </a:r>
+            <a:r>
+              <a:rPr lang="en-US" altLang="ja-JP" sz="1400" dirty="0" err="1" smtClean="0"/>
+              <a:t>num_nodes</a:t>
+            </a:r>
+            <a:r>
+              <a:rPr lang="en-US" altLang="ja-JP" sz="1400" dirty="0" smtClean="0"/>
+              <a:t> = 1;  // If the buffer contains only 1 data block (usually so).</a:t>
+            </a:r>
+          </a:p>
+          <a:p>
+            <a:pPr marL="0" indent="0">
+              <a:buNone/>
+            </a:pPr>
+            <a:r>
+              <a:rPr lang="en-US" altLang="ja-JP" sz="1400" dirty="0" err="1" smtClean="0">
+                <a:solidFill>
+                  <a:srgbClr val="FF0000"/>
+                </a:solidFill>
+              </a:rPr>
+              <a:t>raw_copper.SetBuffer</a:t>
+            </a:r>
+            <a:r>
+              <a:rPr lang="en-US" altLang="ja-JP" sz="1400" dirty="0" smtClean="0">
+                <a:solidFill>
+                  <a:srgbClr val="FF0000"/>
+                </a:solidFill>
+              </a:rPr>
+              <a:t>(buffer, </a:t>
+            </a:r>
+            <a:r>
+              <a:rPr lang="en-US" altLang="ja-JP" sz="1400" dirty="0" err="1" smtClean="0">
+                <a:solidFill>
+                  <a:srgbClr val="FF0000"/>
+                </a:solidFill>
+              </a:rPr>
+              <a:t>nwords</a:t>
+            </a:r>
+            <a:r>
+              <a:rPr lang="en-US" altLang="ja-JP" sz="1400" dirty="0" smtClean="0">
+                <a:solidFill>
+                  <a:srgbClr val="FF0000"/>
+                </a:solidFill>
+              </a:rPr>
+              <a:t>, </a:t>
+            </a:r>
+            <a:r>
+              <a:rPr lang="en-US" altLang="ja-JP" sz="1400" dirty="0" err="1" smtClean="0">
+                <a:solidFill>
+                  <a:srgbClr val="FF0000"/>
+                </a:solidFill>
+              </a:rPr>
+              <a:t>delete_flag</a:t>
+            </a:r>
+            <a:r>
+              <a:rPr lang="en-US" altLang="ja-JP" sz="1400" dirty="0" smtClean="0">
+                <a:solidFill>
+                  <a:srgbClr val="FF0000"/>
+                </a:solidFill>
+              </a:rPr>
+              <a:t>, </a:t>
+            </a:r>
+            <a:r>
+              <a:rPr lang="en-US" altLang="ja-JP" sz="1400" dirty="0" err="1" smtClean="0">
+                <a:solidFill>
+                  <a:srgbClr val="FF0000"/>
+                </a:solidFill>
+              </a:rPr>
+              <a:t>num_event</a:t>
+            </a:r>
+            <a:r>
+              <a:rPr lang="en-US" altLang="ja-JP" sz="1400" dirty="0" smtClean="0">
+                <a:solidFill>
+                  <a:srgbClr val="FF0000"/>
+                </a:solidFill>
+              </a:rPr>
+              <a:t>, </a:t>
+            </a:r>
+            <a:r>
+              <a:rPr lang="en-US" altLang="ja-JP" sz="1400" dirty="0" err="1" smtClean="0">
+                <a:solidFill>
+                  <a:srgbClr val="FF0000"/>
+                </a:solidFill>
+              </a:rPr>
+              <a:t>num_nodes</a:t>
+            </a:r>
+            <a:r>
+              <a:rPr lang="en-US" altLang="ja-JP" sz="1400" dirty="0" smtClean="0">
+                <a:solidFill>
+                  <a:srgbClr val="FF0000"/>
+                </a:solidFill>
+              </a:rPr>
+              <a:t>);</a:t>
+            </a:r>
+          </a:p>
+          <a:p>
+            <a:pPr marL="0" indent="0">
+              <a:buNone/>
+            </a:pPr>
+            <a:endParaRPr lang="en-US" altLang="ja-JP" sz="1400" dirty="0" smtClean="0"/>
+          </a:p>
+          <a:p>
+            <a:pPr marL="0" indent="0">
+              <a:buNone/>
+            </a:pPr>
+            <a:r>
+              <a:rPr lang="en-US" altLang="ja-JP" sz="2400" dirty="0" smtClean="0">
+                <a:solidFill>
+                  <a:srgbClr val="0000CC"/>
+                </a:solidFill>
+              </a:rPr>
+              <a:t>// When you want to convert a Raw*** type</a:t>
+            </a:r>
+          </a:p>
+          <a:p>
+            <a:pPr marL="0" indent="0">
+              <a:buNone/>
+            </a:pPr>
+            <a:r>
+              <a:rPr lang="en-US" altLang="ja-JP" sz="1400" dirty="0" smtClean="0"/>
+              <a:t>{</a:t>
+            </a:r>
+          </a:p>
+          <a:p>
+            <a:pPr marL="0" indent="0">
+              <a:buNone/>
+            </a:pPr>
+            <a:r>
+              <a:rPr lang="en-US" altLang="ja-JP" sz="1400" dirty="0" smtClean="0"/>
+              <a:t>	</a:t>
+            </a:r>
+            <a:r>
+              <a:rPr lang="en-US" altLang="ja-JP" sz="1400" dirty="0" err="1" smtClean="0"/>
+              <a:t>RawSVD</a:t>
+            </a:r>
+            <a:r>
+              <a:rPr lang="en-US" altLang="ja-JP" sz="1400" dirty="0" smtClean="0"/>
+              <a:t> </a:t>
+            </a:r>
+            <a:r>
+              <a:rPr lang="en-US" altLang="ja-JP" sz="1400" dirty="0" err="1" smtClean="0"/>
+              <a:t>raw_svd</a:t>
+            </a:r>
+            <a:r>
+              <a:rPr lang="en-US" altLang="ja-JP" sz="1400" dirty="0" smtClean="0"/>
+              <a:t>;</a:t>
+            </a:r>
+          </a:p>
+          <a:p>
+            <a:pPr marL="0" indent="0">
+              <a:buNone/>
+            </a:pPr>
+            <a:r>
+              <a:rPr lang="en-US" altLang="ja-JP" sz="1400" dirty="0" smtClean="0"/>
+              <a:t>	</a:t>
+            </a:r>
+            <a:r>
+              <a:rPr lang="en-US" altLang="ja-JP" sz="1400" dirty="0" err="1" smtClean="0"/>
+              <a:t>delete_flag</a:t>
+            </a:r>
+            <a:r>
+              <a:rPr lang="en-US" altLang="ja-JP" sz="1400" dirty="0" smtClean="0"/>
+              <a:t> = 0;  // in this case, </a:t>
+            </a:r>
+            <a:r>
+              <a:rPr lang="en-US" altLang="ja-JP" sz="1400" dirty="0" err="1" smtClean="0"/>
+              <a:t>raw_copper</a:t>
+            </a:r>
+            <a:r>
+              <a:rPr lang="en-US" altLang="ja-JP" sz="1400" dirty="0" smtClean="0"/>
+              <a:t> will delete buffer. So </a:t>
+            </a:r>
+            <a:r>
+              <a:rPr lang="en-US" altLang="ja-JP" sz="1400" dirty="0" err="1" smtClean="0"/>
+              <a:t>delete_flag</a:t>
+            </a:r>
+            <a:r>
+              <a:rPr lang="en-US" altLang="ja-JP" sz="1400" dirty="0" smtClean="0"/>
+              <a:t>=1 may cause double-free.</a:t>
+            </a:r>
+          </a:p>
+          <a:p>
+            <a:pPr marL="0" indent="0">
+              <a:buNone/>
+            </a:pPr>
+            <a:r>
+              <a:rPr lang="en-US" altLang="ja-JP" sz="1400" dirty="0" smtClean="0">
+                <a:solidFill>
+                  <a:srgbClr val="FF0000"/>
+                </a:solidFill>
+              </a:rPr>
+              <a:t>	</a:t>
+            </a:r>
+            <a:r>
+              <a:rPr lang="en-US" altLang="ja-JP" sz="1400" dirty="0" err="1" smtClean="0">
+                <a:solidFill>
+                  <a:srgbClr val="FF0000"/>
+                </a:solidFill>
+              </a:rPr>
+              <a:t>raw_svd.SetBuffer</a:t>
+            </a:r>
+            <a:r>
+              <a:rPr lang="en-US" altLang="ja-JP" sz="1400" dirty="0" smtClean="0">
+                <a:solidFill>
+                  <a:srgbClr val="FF0000"/>
+                </a:solidFill>
+              </a:rPr>
+              <a:t>( </a:t>
+            </a:r>
+            <a:r>
+              <a:rPr lang="en-US" altLang="ja-JP" sz="1400" dirty="0" err="1" smtClean="0">
+                <a:solidFill>
+                  <a:srgbClr val="FF0000"/>
+                </a:solidFill>
+              </a:rPr>
+              <a:t>raw_copper.GetWholeBuffer</a:t>
+            </a:r>
+            <a:r>
+              <a:rPr lang="en-US" altLang="ja-JP" sz="1400" dirty="0" smtClean="0">
+                <a:solidFill>
+                  <a:srgbClr val="FF0000"/>
+                </a:solidFill>
+              </a:rPr>
+              <a:t>(), </a:t>
+            </a:r>
+            <a:r>
+              <a:rPr lang="en-US" altLang="ja-JP" sz="1400" dirty="0" err="1">
+                <a:solidFill>
+                  <a:srgbClr val="FF0000"/>
+                </a:solidFill>
+              </a:rPr>
+              <a:t>nwords</a:t>
+            </a:r>
+            <a:r>
+              <a:rPr lang="en-US" altLang="ja-JP" sz="1400" dirty="0">
+                <a:solidFill>
+                  <a:srgbClr val="FF0000"/>
+                </a:solidFill>
+              </a:rPr>
+              <a:t>, </a:t>
+            </a:r>
+            <a:r>
+              <a:rPr lang="en-US" altLang="ja-JP" sz="1400" dirty="0" err="1">
+                <a:solidFill>
+                  <a:srgbClr val="FF0000"/>
+                </a:solidFill>
+              </a:rPr>
+              <a:t>delete_flag</a:t>
+            </a:r>
+            <a:r>
+              <a:rPr lang="en-US" altLang="ja-JP" sz="1400" dirty="0">
+                <a:solidFill>
+                  <a:srgbClr val="FF0000"/>
+                </a:solidFill>
+              </a:rPr>
+              <a:t>, </a:t>
+            </a:r>
+            <a:r>
+              <a:rPr lang="en-US" altLang="ja-JP" sz="1400" dirty="0" err="1">
+                <a:solidFill>
+                  <a:srgbClr val="FF0000"/>
+                </a:solidFill>
+              </a:rPr>
+              <a:t>num_event</a:t>
+            </a:r>
+            <a:r>
+              <a:rPr lang="en-US" altLang="ja-JP" sz="1400" dirty="0">
+                <a:solidFill>
+                  <a:srgbClr val="FF0000"/>
+                </a:solidFill>
+              </a:rPr>
+              <a:t>, </a:t>
+            </a:r>
+            <a:r>
+              <a:rPr lang="en-US" altLang="ja-JP" sz="1400" dirty="0" err="1">
+                <a:solidFill>
+                  <a:srgbClr val="FF0000"/>
+                </a:solidFill>
+              </a:rPr>
+              <a:t>num_nodes</a:t>
+            </a:r>
+            <a:r>
+              <a:rPr lang="en-US" altLang="ja-JP" sz="1400" dirty="0">
+                <a:solidFill>
+                  <a:srgbClr val="FF0000"/>
+                </a:solidFill>
+              </a:rPr>
+              <a:t>);</a:t>
+            </a:r>
+          </a:p>
+          <a:p>
+            <a:pPr marL="0" indent="0">
+              <a:buNone/>
+            </a:pPr>
+            <a:r>
+              <a:rPr lang="en-US" altLang="ja-JP" sz="1400" dirty="0" smtClean="0"/>
+              <a:t>	</a:t>
+            </a:r>
+            <a:r>
+              <a:rPr lang="en-US" altLang="ja-JP" sz="1400" dirty="0" err="1" smtClean="0"/>
+              <a:t>RawDataBlock</a:t>
+            </a:r>
+            <a:r>
+              <a:rPr lang="en-US" altLang="ja-JP" sz="1400" dirty="0" smtClean="0"/>
+              <a:t> </a:t>
+            </a:r>
+            <a:r>
+              <a:rPr lang="en-US" altLang="ja-JP" sz="1400" dirty="0" err="1" smtClean="0"/>
+              <a:t>raw_datablock</a:t>
+            </a:r>
+            <a:r>
+              <a:rPr lang="en-US" altLang="ja-JP" sz="1400" dirty="0" smtClean="0"/>
+              <a:t>;</a:t>
+            </a:r>
+          </a:p>
+          <a:p>
+            <a:pPr marL="0" indent="0">
+              <a:buNone/>
+            </a:pPr>
+            <a:r>
+              <a:rPr lang="en-US" altLang="ja-JP" sz="1400" dirty="0" smtClean="0"/>
+              <a:t>	</a:t>
+            </a:r>
+            <a:r>
+              <a:rPr lang="en-US" altLang="ja-JP" sz="1400" dirty="0" err="1" smtClean="0"/>
+              <a:t>delete_flag</a:t>
+            </a:r>
+            <a:r>
+              <a:rPr lang="en-US" altLang="ja-JP" sz="1400" dirty="0" smtClean="0"/>
+              <a:t> </a:t>
+            </a:r>
+            <a:r>
+              <a:rPr lang="en-US" altLang="ja-JP" sz="1400" dirty="0"/>
+              <a:t>= </a:t>
+            </a:r>
+            <a:r>
+              <a:rPr lang="en-US" altLang="ja-JP" sz="1400" dirty="0" smtClean="0"/>
+              <a:t>0;</a:t>
+            </a:r>
+            <a:r>
+              <a:rPr lang="en-US" altLang="ja-JP" sz="1400" dirty="0"/>
+              <a:t> // in this case, </a:t>
+            </a:r>
+            <a:r>
+              <a:rPr lang="en-US" altLang="ja-JP" sz="1400" dirty="0" err="1"/>
+              <a:t>raw_copper</a:t>
+            </a:r>
+            <a:r>
+              <a:rPr lang="en-US" altLang="ja-JP" sz="1400" dirty="0"/>
+              <a:t> will </a:t>
+            </a:r>
+            <a:r>
+              <a:rPr lang="en-US" altLang="ja-JP" sz="1400" dirty="0" smtClean="0"/>
+              <a:t>delete </a:t>
+            </a:r>
+            <a:r>
+              <a:rPr lang="en-US" altLang="ja-JP" sz="1400" dirty="0"/>
+              <a:t>buffer. So </a:t>
+            </a:r>
+            <a:r>
+              <a:rPr lang="en-US" altLang="ja-JP" sz="1400" dirty="0" err="1"/>
+              <a:t>delete_flag</a:t>
+            </a:r>
+            <a:r>
+              <a:rPr lang="en-US" altLang="ja-JP" sz="1400" dirty="0"/>
+              <a:t>=1 may cause double-free</a:t>
+            </a:r>
+            <a:r>
+              <a:rPr lang="en-US" altLang="ja-JP" sz="1400" dirty="0" smtClean="0"/>
+              <a:t>.</a:t>
+            </a:r>
+            <a:endParaRPr lang="en-US" altLang="ja-JP" sz="1400" dirty="0"/>
+          </a:p>
+          <a:p>
+            <a:pPr marL="0" indent="0">
+              <a:buNone/>
+            </a:pPr>
+            <a:r>
+              <a:rPr lang="en-US" altLang="ja-JP" sz="1400" dirty="0">
+                <a:solidFill>
+                  <a:srgbClr val="FF0000"/>
+                </a:solidFill>
+              </a:rPr>
+              <a:t>	</a:t>
+            </a:r>
+            <a:r>
+              <a:rPr lang="en-US" altLang="ja-JP" sz="1400" dirty="0" err="1" smtClean="0">
+                <a:solidFill>
+                  <a:srgbClr val="FF0000"/>
+                </a:solidFill>
+              </a:rPr>
+              <a:t>raw_datablock.SetBuffer</a:t>
+            </a:r>
+            <a:r>
+              <a:rPr lang="en-US" altLang="ja-JP" sz="1400" dirty="0">
+                <a:solidFill>
+                  <a:srgbClr val="FF0000"/>
+                </a:solidFill>
+              </a:rPr>
+              <a:t>( </a:t>
+            </a:r>
+            <a:r>
+              <a:rPr lang="en-US" altLang="ja-JP" sz="1400" dirty="0" err="1">
+                <a:solidFill>
+                  <a:srgbClr val="FF0000"/>
+                </a:solidFill>
+              </a:rPr>
+              <a:t>raw_copper.GetWholeBuffer</a:t>
+            </a:r>
+            <a:r>
+              <a:rPr lang="en-US" altLang="ja-JP" sz="1400" dirty="0">
+                <a:solidFill>
+                  <a:srgbClr val="FF0000"/>
+                </a:solidFill>
+              </a:rPr>
+              <a:t>(), </a:t>
+            </a:r>
+            <a:r>
+              <a:rPr lang="en-US" altLang="ja-JP" sz="1400" dirty="0" err="1">
+                <a:solidFill>
+                  <a:srgbClr val="FF0000"/>
+                </a:solidFill>
+              </a:rPr>
+              <a:t>nwords</a:t>
+            </a:r>
+            <a:r>
+              <a:rPr lang="en-US" altLang="ja-JP" sz="1400" dirty="0">
+                <a:solidFill>
+                  <a:srgbClr val="FF0000"/>
+                </a:solidFill>
+              </a:rPr>
+              <a:t>, </a:t>
+            </a:r>
+            <a:r>
+              <a:rPr lang="en-US" altLang="ja-JP" sz="1400" dirty="0" err="1">
+                <a:solidFill>
+                  <a:srgbClr val="FF0000"/>
+                </a:solidFill>
+              </a:rPr>
+              <a:t>delete_flag</a:t>
+            </a:r>
+            <a:r>
+              <a:rPr lang="en-US" altLang="ja-JP" sz="1400" dirty="0">
+                <a:solidFill>
+                  <a:srgbClr val="FF0000"/>
+                </a:solidFill>
+              </a:rPr>
+              <a:t>, </a:t>
+            </a:r>
+            <a:r>
+              <a:rPr lang="en-US" altLang="ja-JP" sz="1400" dirty="0" err="1">
+                <a:solidFill>
+                  <a:srgbClr val="FF0000"/>
+                </a:solidFill>
+              </a:rPr>
+              <a:t>num_event</a:t>
+            </a:r>
+            <a:r>
+              <a:rPr lang="en-US" altLang="ja-JP" sz="1400" dirty="0">
+                <a:solidFill>
+                  <a:srgbClr val="FF0000"/>
+                </a:solidFill>
+              </a:rPr>
+              <a:t>, </a:t>
+            </a:r>
+            <a:r>
+              <a:rPr lang="en-US" altLang="ja-JP" sz="1400" dirty="0" err="1">
+                <a:solidFill>
+                  <a:srgbClr val="FF0000"/>
+                </a:solidFill>
+              </a:rPr>
+              <a:t>num_nodes</a:t>
+            </a:r>
+            <a:r>
+              <a:rPr lang="en-US" altLang="ja-JP" sz="1400" dirty="0" smtClean="0">
+                <a:solidFill>
+                  <a:srgbClr val="FF0000"/>
+                </a:solidFill>
+              </a:rPr>
+              <a:t>);</a:t>
+            </a:r>
+            <a:endParaRPr lang="en-US" altLang="ja-JP" sz="1400" dirty="0"/>
+          </a:p>
+          <a:p>
+            <a:pPr marL="0" indent="0">
+              <a:buNone/>
+            </a:pPr>
+            <a:r>
+              <a:rPr lang="en-US" altLang="ja-JP" sz="1400" dirty="0" smtClean="0"/>
+              <a:t>}</a:t>
+            </a:r>
           </a:p>
         </p:txBody>
       </p:sp>
     </p:spTree>
     <p:extLst>
       <p:ext uri="{BB962C8B-B14F-4D97-AF65-F5344CB8AC3E}">
-        <p14:creationId xmlns:p14="http://schemas.microsoft.com/office/powerpoint/2010/main" val="1787463662"/>
+        <p14:creationId xmlns:p14="http://schemas.microsoft.com/office/powerpoint/2010/main" val="2196253738"/>
       </p:ext>
     </p:extLst>
   </p:cSld>
@@ -5357,1022 +6079,61 @@
       </p:grpSpPr>
       <p:sp>
         <p:nvSpPr>
-          <p:cNvPr id="2" name="タイトル 1"/>
-          <p:cNvSpPr>
-            <a:spLocks noGrp="1"/>
+          <p:cNvPr id="4" name="タイトル 1"/>
+          <p:cNvSpPr txBox="1">
+            <a:spLocks/>
           </p:cNvSpPr>
-          <p:nvPr>
-            <p:ph type="title"/>
-          </p:nvPr>
+          <p:nvPr/>
         </p:nvSpPr>
         <p:spPr>
           <a:xfrm>
-            <a:off x="91371" y="0"/>
-            <a:ext cx="11319165" cy="771771"/>
-          </a:xfrm>
-        </p:spPr>
-        <p:txBody>
-          <a:bodyPr/>
-          <a:lstStyle/>
-          <a:p>
-            <a:r>
-              <a:rPr lang="en-US" altLang="ja-JP" u="sng" dirty="0" smtClean="0"/>
-              <a:t>2-1, Function to store data in </a:t>
-            </a:r>
-            <a:r>
-              <a:rPr lang="en-US" altLang="ja-JP" u="sng" dirty="0" err="1" smtClean="0"/>
-              <a:t>RawCOPPER</a:t>
-            </a:r>
-            <a:r>
-              <a:rPr lang="en-US" altLang="ja-JP" u="sng" dirty="0" smtClean="0"/>
-              <a:t> object</a:t>
-            </a:r>
-            <a:endParaRPr kumimoji="1" lang="ja-JP" altLang="en-US" u="sng" dirty="0"/>
-          </a:p>
-        </p:txBody>
-      </p:sp>
-      <p:sp>
-        <p:nvSpPr>
-          <p:cNvPr id="3" name="コンテンツ プレースホルダー 2"/>
-          <p:cNvSpPr>
-            <a:spLocks noGrp="1"/>
-          </p:cNvSpPr>
-          <p:nvPr>
-            <p:ph idx="1"/>
-          </p:nvPr>
-        </p:nvSpPr>
-        <p:spPr>
-          <a:xfrm>
-            <a:off x="91371" y="1890465"/>
-            <a:ext cx="6391923" cy="2011834"/>
-          </a:xfrm>
-          <a:ln>
-            <a:solidFill>
-              <a:schemeClr val="accent1">
-                <a:lumMod val="40000"/>
-                <a:lumOff val="60000"/>
-              </a:schemeClr>
-            </a:solidFill>
-          </a:ln>
-        </p:spPr>
-        <p:txBody>
-          <a:bodyPr>
-            <a:normAutofit/>
-          </a:bodyPr>
-          <a:lstStyle/>
-          <a:p>
-            <a:pPr marL="0" indent="0">
-              <a:buNone/>
-            </a:pPr>
-            <a:r>
-              <a:rPr lang="en-US" altLang="ja-JP" sz="1600" dirty="0" smtClean="0"/>
-              <a:t>Input variables :</a:t>
-            </a:r>
-            <a:endParaRPr kumimoji="1" lang="en-US" altLang="ja-JP" sz="1600" dirty="0" smtClean="0"/>
-          </a:p>
-          <a:p>
-            <a:pPr marL="0" indent="0">
-              <a:buNone/>
-            </a:pPr>
-            <a:r>
-              <a:rPr lang="en-US" altLang="ja-JP" sz="1600" dirty="0" err="1" smtClean="0">
-                <a:solidFill>
-                  <a:srgbClr val="FF0000"/>
-                </a:solidFill>
-              </a:rPr>
-              <a:t>int</a:t>
-            </a:r>
-            <a:r>
-              <a:rPr lang="en-US" altLang="ja-JP" sz="1600" dirty="0" smtClean="0">
-                <a:solidFill>
-                  <a:srgbClr val="FF0000"/>
-                </a:solidFill>
-              </a:rPr>
-              <a:t>* </a:t>
-            </a:r>
-            <a:r>
-              <a:rPr lang="en-US" altLang="ja-JP" sz="1600" dirty="0" err="1" smtClean="0">
-                <a:solidFill>
-                  <a:srgbClr val="FF0000"/>
-                </a:solidFill>
-              </a:rPr>
-              <a:t>detector_buf</a:t>
-            </a:r>
-            <a:r>
-              <a:rPr lang="en-US" altLang="ja-JP" sz="1600" dirty="0" smtClean="0">
-                <a:solidFill>
-                  <a:srgbClr val="FF0000"/>
-                </a:solidFill>
-              </a:rPr>
-              <a:t>_*** </a:t>
-            </a:r>
-            <a:r>
-              <a:rPr lang="en-US" altLang="ja-JP" sz="1600" dirty="0" smtClean="0"/>
-              <a:t>: pointer to the detector buffer that you want to store as ***</a:t>
-            </a:r>
-            <a:r>
-              <a:rPr lang="en-US" altLang="ja-JP" sz="1600" dirty="0" err="1" smtClean="0"/>
-              <a:t>th</a:t>
-            </a:r>
-            <a:r>
-              <a:rPr lang="en-US" altLang="ja-JP" sz="1600" dirty="0" smtClean="0"/>
-              <a:t> FINESSE data.</a:t>
-            </a:r>
-          </a:p>
-          <a:p>
-            <a:pPr marL="0" indent="0">
-              <a:buNone/>
-            </a:pPr>
-            <a:r>
-              <a:rPr lang="en-US" altLang="ja-JP" sz="1600" dirty="0" err="1">
-                <a:solidFill>
-                  <a:srgbClr val="FF0000"/>
-                </a:solidFill>
-              </a:rPr>
-              <a:t>i</a:t>
-            </a:r>
-            <a:r>
-              <a:rPr kumimoji="1" lang="en-US" altLang="ja-JP" sz="1600" dirty="0" err="1" smtClean="0">
-                <a:solidFill>
-                  <a:srgbClr val="FF0000"/>
-                </a:solidFill>
-              </a:rPr>
-              <a:t>nt</a:t>
-            </a:r>
-            <a:r>
-              <a:rPr kumimoji="1" lang="en-US" altLang="ja-JP" sz="1600" dirty="0" smtClean="0">
-                <a:solidFill>
-                  <a:srgbClr val="FF0000"/>
-                </a:solidFill>
-              </a:rPr>
-              <a:t> </a:t>
-            </a:r>
-            <a:r>
-              <a:rPr kumimoji="1" lang="en-US" altLang="ja-JP" sz="1600" dirty="0" err="1" smtClean="0">
-                <a:solidFill>
-                  <a:srgbClr val="FF0000"/>
-                </a:solidFill>
-              </a:rPr>
-              <a:t>nwords</a:t>
-            </a:r>
-            <a:r>
-              <a:rPr kumimoji="1" lang="en-US" altLang="ja-JP" sz="1600" dirty="0" smtClean="0">
-                <a:solidFill>
-                  <a:srgbClr val="FF0000"/>
-                </a:solidFill>
-              </a:rPr>
-              <a:t>_*** </a:t>
-            </a:r>
-            <a:r>
-              <a:rPr kumimoji="1" lang="en-US" altLang="ja-JP" sz="1600" dirty="0" smtClean="0"/>
-              <a:t>: length of the </a:t>
-            </a:r>
-            <a:r>
-              <a:rPr kumimoji="1" lang="en-US" altLang="ja-JP" sz="1600" dirty="0" err="1" smtClean="0"/>
-              <a:t>detector_buf</a:t>
-            </a:r>
-            <a:r>
-              <a:rPr kumimoji="1" lang="en-US" altLang="ja-JP" sz="1600" dirty="0" smtClean="0"/>
-              <a:t>_***  (unit -&gt; word = 4bytes )</a:t>
-            </a:r>
-          </a:p>
-          <a:p>
-            <a:pPr marL="0" indent="0">
-              <a:buNone/>
-            </a:pPr>
-            <a:r>
-              <a:rPr lang="en-US" altLang="ja-JP" sz="1600" dirty="0" err="1" smtClean="0">
-                <a:solidFill>
-                  <a:srgbClr val="FF0000"/>
-                </a:solidFill>
-              </a:rPr>
-              <a:t>RawCOPPERPackerInfo</a:t>
-            </a:r>
-            <a:r>
-              <a:rPr lang="en-US" altLang="ja-JP" sz="1600" dirty="0" smtClean="0">
-                <a:solidFill>
-                  <a:srgbClr val="FF0000"/>
-                </a:solidFill>
-              </a:rPr>
-              <a:t> </a:t>
-            </a:r>
-            <a:r>
-              <a:rPr lang="en-US" altLang="ja-JP" sz="1600" dirty="0" err="1" smtClean="0">
-                <a:solidFill>
-                  <a:srgbClr val="FF0000"/>
-                </a:solidFill>
-              </a:rPr>
-              <a:t>rawcprpacker_info</a:t>
-            </a:r>
-            <a:r>
-              <a:rPr lang="en-US" altLang="ja-JP" sz="1600" dirty="0" smtClean="0"/>
-              <a:t> : Information to</a:t>
-            </a:r>
-          </a:p>
-          <a:p>
-            <a:pPr marL="0" indent="0">
-              <a:buNone/>
-            </a:pPr>
-            <a:r>
-              <a:rPr lang="en-US" altLang="ja-JP" sz="1600" dirty="0"/>
-              <a:t> fill </a:t>
-            </a:r>
-            <a:r>
-              <a:rPr lang="en-US" altLang="ja-JP" sz="1600" dirty="0" err="1" smtClean="0"/>
-              <a:t>RawHeader</a:t>
-            </a:r>
-            <a:endParaRPr lang="en-US" altLang="ja-JP" sz="1600" dirty="0"/>
-          </a:p>
-        </p:txBody>
-      </p:sp>
-      <p:sp>
-        <p:nvSpPr>
-          <p:cNvPr id="4" name="正方形/長方形 3"/>
-          <p:cNvSpPr/>
-          <p:nvPr/>
-        </p:nvSpPr>
-        <p:spPr>
-          <a:xfrm>
-            <a:off x="91371" y="771771"/>
-            <a:ext cx="12067505" cy="1015663"/>
+            <a:off x="4495801" y="2309835"/>
+            <a:ext cx="3901225" cy="1325563"/>
           </a:xfrm>
           <a:prstGeom prst="rect">
             <a:avLst/>
           </a:prstGeom>
         </p:spPr>
         <p:txBody>
-          <a:bodyPr wrap="square">
-            <a:spAutoFit/>
+          <a:bodyPr vert="horz" lIns="91440" tIns="45720" rIns="91440" bIns="45720" rtlCol="0" anchor="ctr">
+            <a:normAutofit/>
           </a:bodyPr>
-          <a:lstStyle/>
-          <a:p>
-            <a:r>
-              <a:rPr lang="en-US" altLang="ja-JP" sz="2000" dirty="0">
-                <a:solidFill>
-                  <a:srgbClr val="00B050"/>
-                </a:solidFill>
-              </a:rPr>
-              <a:t>void </a:t>
-            </a:r>
-            <a:r>
-              <a:rPr lang="en-US" altLang="ja-JP" sz="2000" dirty="0" err="1">
-                <a:solidFill>
-                  <a:srgbClr val="00B050"/>
-                </a:solidFill>
-              </a:rPr>
-              <a:t>RawCOPPER</a:t>
-            </a:r>
-            <a:r>
-              <a:rPr lang="en-US" altLang="ja-JP" sz="2000" dirty="0">
-                <a:solidFill>
-                  <a:srgbClr val="00B050"/>
-                </a:solidFill>
-              </a:rPr>
-              <a:t>::</a:t>
-            </a:r>
-            <a:r>
-              <a:rPr lang="en-US" altLang="ja-JP" sz="2000" dirty="0" err="1">
-                <a:solidFill>
-                  <a:srgbClr val="00B050"/>
-                </a:solidFill>
-              </a:rPr>
-              <a:t>PackDetectorBuf</a:t>
-            </a:r>
-            <a:r>
-              <a:rPr lang="en-US" altLang="ja-JP" sz="2000" dirty="0">
-                <a:solidFill>
-                  <a:srgbClr val="00B050"/>
-                </a:solidFill>
-              </a:rPr>
-              <a:t>(  </a:t>
-            </a:r>
-            <a:r>
-              <a:rPr lang="en-US" altLang="ja-JP" sz="2000" dirty="0" err="1"/>
-              <a:t>int</a:t>
-            </a:r>
-            <a:r>
-              <a:rPr lang="en-US" altLang="ja-JP" sz="2000" dirty="0"/>
-              <a:t>* detector_buf_1st, </a:t>
-            </a:r>
-            <a:r>
-              <a:rPr lang="en-US" altLang="ja-JP" sz="2000" dirty="0" err="1"/>
-              <a:t>int</a:t>
-            </a:r>
-            <a:r>
-              <a:rPr lang="en-US" altLang="ja-JP" sz="2000" dirty="0"/>
-              <a:t> nwords_1st,  </a:t>
-            </a:r>
-            <a:r>
-              <a:rPr lang="en-US" altLang="ja-JP" sz="2000" dirty="0" err="1"/>
-              <a:t>int</a:t>
-            </a:r>
-            <a:r>
-              <a:rPr lang="en-US" altLang="ja-JP" sz="2000" dirty="0"/>
-              <a:t>* detector_buf_2nd, </a:t>
-            </a:r>
-            <a:r>
-              <a:rPr lang="en-US" altLang="ja-JP" sz="2000" dirty="0" err="1"/>
-              <a:t>int</a:t>
-            </a:r>
-            <a:r>
-              <a:rPr lang="en-US" altLang="ja-JP" sz="2000" dirty="0"/>
-              <a:t> nwords_2nd</a:t>
-            </a:r>
-            <a:r>
-              <a:rPr lang="en-US" altLang="ja-JP" sz="2000" dirty="0" smtClean="0"/>
-              <a:t>,  </a:t>
-            </a:r>
-            <a:r>
-              <a:rPr lang="en-US" altLang="ja-JP" sz="2000" dirty="0" err="1"/>
-              <a:t>int</a:t>
-            </a:r>
-            <a:r>
-              <a:rPr lang="en-US" altLang="ja-JP" sz="2000" dirty="0"/>
-              <a:t>* detector_buf_3rd, </a:t>
-            </a:r>
-            <a:r>
-              <a:rPr lang="en-US" altLang="ja-JP" sz="2000" dirty="0" err="1"/>
-              <a:t>int</a:t>
-            </a:r>
-            <a:r>
-              <a:rPr lang="en-US" altLang="ja-JP" sz="2000" dirty="0"/>
-              <a:t> nwords_3rd,  </a:t>
-            </a:r>
-            <a:r>
-              <a:rPr lang="en-US" altLang="ja-JP" sz="2000" dirty="0" err="1"/>
-              <a:t>int</a:t>
-            </a:r>
-            <a:r>
-              <a:rPr lang="en-US" altLang="ja-JP" sz="2000" dirty="0"/>
-              <a:t>* detector_buf_4th, </a:t>
-            </a:r>
-            <a:r>
-              <a:rPr lang="en-US" altLang="ja-JP" sz="2000" dirty="0" err="1"/>
-              <a:t>int</a:t>
-            </a:r>
-            <a:r>
-              <a:rPr lang="en-US" altLang="ja-JP" sz="2000" dirty="0"/>
-              <a:t> nwords_4th,   </a:t>
-            </a:r>
-            <a:r>
-              <a:rPr lang="en-US" altLang="ja-JP" sz="2000" dirty="0" err="1"/>
-              <a:t>RawCOPPERPackerInfo</a:t>
-            </a:r>
-            <a:r>
-              <a:rPr lang="en-US" altLang="ja-JP" sz="2000" dirty="0"/>
-              <a:t>  </a:t>
-            </a:r>
-            <a:r>
-              <a:rPr lang="en-US" altLang="ja-JP" sz="2000" dirty="0" err="1"/>
-              <a:t>rawcprpacker_info</a:t>
-            </a:r>
-            <a:r>
-              <a:rPr lang="en-US" altLang="ja-JP" sz="2000" dirty="0"/>
-              <a:t> </a:t>
-            </a:r>
-            <a:r>
-              <a:rPr lang="en-US" altLang="ja-JP" sz="2000" dirty="0">
-                <a:solidFill>
-                  <a:srgbClr val="00B050"/>
-                </a:solidFill>
-              </a:rPr>
-              <a:t>){}</a:t>
-            </a:r>
-            <a:endParaRPr lang="en-US" altLang="ja-JP" sz="2000" dirty="0">
-              <a:solidFill>
-                <a:srgbClr val="00B050"/>
-              </a:solidFill>
-            </a:endParaRPr>
-          </a:p>
-        </p:txBody>
-      </p:sp>
-      <p:sp>
-        <p:nvSpPr>
-          <p:cNvPr id="5" name="正方形/長方形 4"/>
-          <p:cNvSpPr/>
-          <p:nvPr/>
-        </p:nvSpPr>
-        <p:spPr>
-          <a:xfrm>
-            <a:off x="5750953" y="3085588"/>
-            <a:ext cx="6096000" cy="3539430"/>
-          </a:xfrm>
-          <a:prstGeom prst="rect">
-            <a:avLst/>
-          </a:prstGeom>
-          <a:ln>
-            <a:solidFill>
-              <a:schemeClr val="accent6">
-                <a:lumMod val="75000"/>
-              </a:schemeClr>
-            </a:solidFill>
-          </a:ln>
-        </p:spPr>
-        <p:txBody>
-          <a:bodyPr>
-            <a:spAutoFit/>
-          </a:bodyPr>
-          <a:lstStyle/>
-          <a:p>
-            <a:r>
-              <a:rPr lang="en-US" altLang="ja-JP" sz="1400" dirty="0">
-                <a:solidFill>
-                  <a:srgbClr val="00B0F0"/>
-                </a:solidFill>
-              </a:rPr>
-              <a:t> </a:t>
-            </a:r>
-            <a:r>
-              <a:rPr lang="en-US" altLang="ja-JP" sz="1400" dirty="0" err="1">
-                <a:solidFill>
-                  <a:srgbClr val="00B0F0"/>
-                </a:solidFill>
-              </a:rPr>
-              <a:t>struct</a:t>
-            </a:r>
-            <a:r>
-              <a:rPr lang="en-US" altLang="ja-JP" sz="1400" dirty="0">
-                <a:solidFill>
-                  <a:srgbClr val="00B0F0"/>
-                </a:solidFill>
-              </a:rPr>
-              <a:t> </a:t>
-            </a:r>
-            <a:r>
-              <a:rPr lang="en-US" altLang="ja-JP" sz="1400" dirty="0" err="1">
-                <a:solidFill>
-                  <a:srgbClr val="00B0F0"/>
-                </a:solidFill>
-              </a:rPr>
-              <a:t>RawCOPPERPackerInfo</a:t>
-            </a:r>
-            <a:r>
-              <a:rPr lang="en-US" altLang="ja-JP" sz="1400" dirty="0">
-                <a:solidFill>
-                  <a:srgbClr val="00B0F0"/>
-                </a:solidFill>
-              </a:rPr>
-              <a:t> {</a:t>
-            </a:r>
-          </a:p>
-          <a:p>
-            <a:r>
-              <a:rPr lang="en-US" altLang="ja-JP" sz="1400" dirty="0">
-                <a:solidFill>
-                  <a:srgbClr val="00B0F0"/>
-                </a:solidFill>
-              </a:rPr>
-              <a:t>    unsigned </a:t>
-            </a:r>
-            <a:r>
-              <a:rPr lang="en-US" altLang="ja-JP" sz="1400" dirty="0" err="1">
-                <a:solidFill>
-                  <a:srgbClr val="00B0F0"/>
-                </a:solidFill>
-              </a:rPr>
-              <a:t>int</a:t>
-            </a:r>
-            <a:r>
-              <a:rPr lang="en-US" altLang="ja-JP" sz="1400" dirty="0">
-                <a:solidFill>
-                  <a:srgbClr val="00B0F0"/>
-                </a:solidFill>
-              </a:rPr>
-              <a:t> </a:t>
-            </a:r>
-            <a:r>
-              <a:rPr lang="en-US" altLang="ja-JP" sz="1400" dirty="0" err="1">
-                <a:solidFill>
-                  <a:srgbClr val="00B0F0"/>
-                </a:solidFill>
-              </a:rPr>
-              <a:t>exp_num</a:t>
-            </a:r>
-            <a:r>
-              <a:rPr lang="en-US" altLang="ja-JP" sz="1400" dirty="0">
-                <a:solidFill>
-                  <a:srgbClr val="00B0F0"/>
-                </a:solidFill>
-              </a:rPr>
-              <a:t>; </a:t>
-            </a:r>
-            <a:r>
-              <a:rPr lang="en-US" altLang="ja-JP" sz="1400" dirty="0"/>
-              <a:t>// 10bit</a:t>
-            </a:r>
-          </a:p>
-          <a:p>
-            <a:r>
-              <a:rPr lang="en-US" altLang="ja-JP" sz="1400" dirty="0">
-                <a:solidFill>
-                  <a:srgbClr val="00B0F0"/>
-                </a:solidFill>
-              </a:rPr>
-              <a:t>    unsigned </a:t>
-            </a:r>
-            <a:r>
-              <a:rPr lang="en-US" altLang="ja-JP" sz="1400" dirty="0" err="1">
-                <a:solidFill>
-                  <a:srgbClr val="00B0F0"/>
-                </a:solidFill>
-              </a:rPr>
-              <a:t>int</a:t>
-            </a:r>
-            <a:r>
-              <a:rPr lang="en-US" altLang="ja-JP" sz="1400" dirty="0">
-                <a:solidFill>
-                  <a:srgbClr val="00B0F0"/>
-                </a:solidFill>
-              </a:rPr>
-              <a:t> </a:t>
-            </a:r>
-            <a:r>
-              <a:rPr lang="en-US" altLang="ja-JP" sz="1400" dirty="0" err="1">
-                <a:solidFill>
-                  <a:srgbClr val="00B0F0"/>
-                </a:solidFill>
-              </a:rPr>
-              <a:t>run_subrun_num</a:t>
-            </a:r>
-            <a:r>
-              <a:rPr lang="en-US" altLang="ja-JP" sz="1400" dirty="0">
-                <a:solidFill>
-                  <a:srgbClr val="00B0F0"/>
-                </a:solidFill>
-              </a:rPr>
-              <a:t>; </a:t>
-            </a:r>
-            <a:r>
-              <a:rPr lang="en-US" altLang="ja-JP" sz="1400" dirty="0"/>
-              <a:t>// 22bit</a:t>
-            </a:r>
-          </a:p>
-          <a:p>
-            <a:r>
-              <a:rPr lang="en-US" altLang="ja-JP" sz="1400" dirty="0">
-                <a:solidFill>
-                  <a:srgbClr val="00B0F0"/>
-                </a:solidFill>
-              </a:rPr>
-              <a:t>    unsigned </a:t>
-            </a:r>
-            <a:r>
-              <a:rPr lang="en-US" altLang="ja-JP" sz="1400" dirty="0" err="1">
-                <a:solidFill>
-                  <a:srgbClr val="00B0F0"/>
-                </a:solidFill>
-              </a:rPr>
-              <a:t>int</a:t>
-            </a:r>
-            <a:r>
-              <a:rPr lang="en-US" altLang="ja-JP" sz="1400" dirty="0">
-                <a:solidFill>
-                  <a:srgbClr val="00B0F0"/>
-                </a:solidFill>
-              </a:rPr>
-              <a:t> </a:t>
-            </a:r>
-            <a:r>
-              <a:rPr lang="en-US" altLang="ja-JP" sz="1400" dirty="0" err="1">
-                <a:solidFill>
-                  <a:srgbClr val="00B0F0"/>
-                </a:solidFill>
-              </a:rPr>
-              <a:t>eve_num</a:t>
-            </a:r>
-            <a:r>
-              <a:rPr lang="en-US" altLang="ja-JP" sz="1400" dirty="0">
-                <a:solidFill>
-                  <a:srgbClr val="00B0F0"/>
-                </a:solidFill>
-              </a:rPr>
-              <a:t>; </a:t>
-            </a:r>
-            <a:r>
-              <a:rPr lang="en-US" altLang="ja-JP" sz="1400" dirty="0"/>
-              <a:t>// 32bit</a:t>
-            </a:r>
-          </a:p>
-          <a:p>
-            <a:r>
-              <a:rPr lang="en-US" altLang="ja-JP" sz="1400" dirty="0" smtClean="0">
-                <a:solidFill>
-                  <a:srgbClr val="00B0F0"/>
-                </a:solidFill>
-              </a:rPr>
-              <a:t>    unsigned </a:t>
-            </a:r>
-            <a:r>
-              <a:rPr lang="en-US" altLang="ja-JP" sz="1400" dirty="0" err="1" smtClean="0">
-                <a:solidFill>
-                  <a:srgbClr val="00B0F0"/>
-                </a:solidFill>
-              </a:rPr>
-              <a:t>int</a:t>
-            </a:r>
-            <a:r>
-              <a:rPr lang="en-US" altLang="ja-JP" sz="1400" dirty="0" smtClean="0">
-                <a:solidFill>
-                  <a:srgbClr val="00B0F0"/>
-                </a:solidFill>
-              </a:rPr>
-              <a:t> </a:t>
-            </a:r>
-            <a:r>
-              <a:rPr lang="en-US" altLang="ja-JP" sz="1400" dirty="0" err="1" smtClean="0">
-                <a:solidFill>
-                  <a:srgbClr val="00B0F0"/>
-                </a:solidFill>
-              </a:rPr>
-              <a:t>node_id</a:t>
-            </a:r>
-            <a:r>
-              <a:rPr lang="en-US" altLang="ja-JP" sz="1400" dirty="0" smtClean="0">
-                <a:solidFill>
-                  <a:srgbClr val="00B0F0"/>
-                </a:solidFill>
-              </a:rPr>
-              <a:t>; </a:t>
-            </a:r>
-            <a:r>
-              <a:rPr lang="en-US" altLang="ja-JP" sz="1400" dirty="0" smtClean="0"/>
-              <a:t>// 32bit</a:t>
-            </a:r>
-          </a:p>
-          <a:p>
-            <a:r>
-              <a:rPr lang="en-US" altLang="ja-JP" sz="1400" dirty="0" smtClean="0">
-                <a:solidFill>
-                  <a:srgbClr val="00B0F0"/>
-                </a:solidFill>
-              </a:rPr>
-              <a:t>    </a:t>
-            </a:r>
-            <a:r>
-              <a:rPr lang="en-US" altLang="ja-JP" sz="1400" dirty="0">
-                <a:solidFill>
-                  <a:srgbClr val="00B0F0"/>
-                </a:solidFill>
-              </a:rPr>
-              <a:t>unsigned </a:t>
-            </a:r>
-            <a:r>
-              <a:rPr lang="en-US" altLang="ja-JP" sz="1400" dirty="0" err="1">
-                <a:solidFill>
-                  <a:srgbClr val="00B0F0"/>
-                </a:solidFill>
-              </a:rPr>
-              <a:t>int</a:t>
-            </a:r>
-            <a:r>
-              <a:rPr lang="en-US" altLang="ja-JP" sz="1400" dirty="0">
-                <a:solidFill>
-                  <a:srgbClr val="00B0F0"/>
-                </a:solidFill>
-              </a:rPr>
-              <a:t> </a:t>
-            </a:r>
-            <a:r>
-              <a:rPr lang="en-US" altLang="ja-JP" sz="1400" dirty="0" err="1">
-                <a:solidFill>
-                  <a:srgbClr val="00B0F0"/>
-                </a:solidFill>
-              </a:rPr>
-              <a:t>tt_ctime</a:t>
-            </a:r>
-            <a:r>
-              <a:rPr lang="en-US" altLang="ja-JP" sz="1400" dirty="0">
-                <a:solidFill>
-                  <a:srgbClr val="00B0F0"/>
-                </a:solidFill>
-              </a:rPr>
-              <a:t>; </a:t>
-            </a:r>
-            <a:r>
-              <a:rPr lang="en-US" altLang="ja-JP" sz="1400" dirty="0" smtClean="0"/>
-              <a:t>// 27bit clock ticks at trigger timing distributed by FTSW. For details, see </a:t>
-            </a:r>
-            <a:r>
-              <a:rPr lang="en-US" altLang="ja-JP" sz="1400" dirty="0" err="1" smtClean="0"/>
-              <a:t>Nakao</a:t>
-            </a:r>
-            <a:r>
-              <a:rPr lang="en-US" altLang="ja-JP" sz="1400" dirty="0" smtClean="0"/>
-              <a:t>-san's belle2link user guide</a:t>
-            </a:r>
-          </a:p>
-          <a:p>
-            <a:r>
-              <a:rPr lang="en-US" altLang="ja-JP" sz="1400" dirty="0" smtClean="0">
-                <a:solidFill>
-                  <a:srgbClr val="00B0F0"/>
-                </a:solidFill>
-              </a:rPr>
-              <a:t>    unsigned </a:t>
-            </a:r>
-            <a:r>
-              <a:rPr lang="en-US" altLang="ja-JP" sz="1400" dirty="0" err="1" smtClean="0">
-                <a:solidFill>
-                  <a:srgbClr val="00B0F0"/>
-                </a:solidFill>
-              </a:rPr>
-              <a:t>int</a:t>
-            </a:r>
-            <a:r>
-              <a:rPr lang="en-US" altLang="ja-JP" sz="1400" dirty="0" smtClean="0">
-                <a:solidFill>
-                  <a:srgbClr val="00B0F0"/>
-                </a:solidFill>
-              </a:rPr>
-              <a:t> </a:t>
-            </a:r>
-            <a:r>
-              <a:rPr lang="en-US" altLang="ja-JP" sz="1400" dirty="0" err="1" smtClean="0">
-                <a:solidFill>
-                  <a:srgbClr val="00B0F0"/>
-                </a:solidFill>
-              </a:rPr>
-              <a:t>tt_utime</a:t>
-            </a:r>
-            <a:r>
-              <a:rPr lang="en-US" altLang="ja-JP" sz="1400" dirty="0" smtClean="0">
-                <a:solidFill>
-                  <a:srgbClr val="00B0F0"/>
-                </a:solidFill>
-              </a:rPr>
-              <a:t>; </a:t>
-            </a:r>
-            <a:r>
-              <a:rPr lang="en-US" altLang="ja-JP" sz="1400" dirty="0" smtClean="0"/>
-              <a:t>// 32bit </a:t>
-            </a:r>
-            <a:r>
-              <a:rPr lang="en-US" altLang="ja-JP" sz="1400" dirty="0" err="1" smtClean="0"/>
-              <a:t>unitx</a:t>
-            </a:r>
-            <a:r>
-              <a:rPr lang="en-US" altLang="ja-JP" sz="1400" dirty="0" smtClean="0"/>
-              <a:t> time at trigger timing distributed by FTSW. For details, see </a:t>
-            </a:r>
-            <a:r>
-              <a:rPr lang="en-US" altLang="ja-JP" sz="1400" dirty="0" err="1" smtClean="0"/>
-              <a:t>Nakao</a:t>
-            </a:r>
-            <a:r>
-              <a:rPr lang="en-US" altLang="ja-JP" sz="1400" dirty="0" smtClean="0"/>
-              <a:t>-san's belle2link user guide</a:t>
-            </a:r>
-          </a:p>
-          <a:p>
-            <a:r>
-              <a:rPr lang="en-US" altLang="ja-JP" sz="1400" dirty="0" smtClean="0">
-                <a:solidFill>
-                  <a:srgbClr val="00B0F0"/>
-                </a:solidFill>
-              </a:rPr>
-              <a:t>    </a:t>
-            </a:r>
-            <a:r>
-              <a:rPr lang="en-US" altLang="ja-JP" sz="1400" dirty="0">
-                <a:solidFill>
-                  <a:srgbClr val="00B0F0"/>
-                </a:solidFill>
-              </a:rPr>
-              <a:t>unsigned </a:t>
-            </a:r>
-            <a:r>
-              <a:rPr lang="en-US" altLang="ja-JP" sz="1400" dirty="0" err="1">
-                <a:solidFill>
-                  <a:srgbClr val="00B0F0"/>
-                </a:solidFill>
-              </a:rPr>
-              <a:t>int</a:t>
-            </a:r>
-            <a:r>
-              <a:rPr lang="en-US" altLang="ja-JP" sz="1400" dirty="0">
-                <a:solidFill>
-                  <a:srgbClr val="00B0F0"/>
-                </a:solidFill>
-              </a:rPr>
-              <a:t> b2l_ctime; </a:t>
-            </a:r>
-            <a:r>
-              <a:rPr lang="en-US" altLang="ja-JP" sz="1400" dirty="0"/>
-              <a:t>// 27bit clock ticks at trigger timing measured by HSLB on COPPER. For details, see </a:t>
-            </a:r>
-            <a:r>
-              <a:rPr lang="en-US" altLang="ja-JP" sz="1400" dirty="0" err="1"/>
-              <a:t>Nakao</a:t>
-            </a:r>
-            <a:r>
-              <a:rPr lang="en-US" altLang="ja-JP" sz="1400" dirty="0"/>
-              <a:t>-san's belle2link user guide</a:t>
-            </a:r>
-          </a:p>
-          <a:p>
-            <a:r>
-              <a:rPr lang="en-US" altLang="ja-JP" sz="1400" dirty="0">
-                <a:solidFill>
-                  <a:srgbClr val="00B0F0"/>
-                </a:solidFill>
-              </a:rPr>
-              <a:t>    unsigned </a:t>
-            </a:r>
-            <a:r>
-              <a:rPr lang="en-US" altLang="ja-JP" sz="1400" dirty="0" err="1">
-                <a:solidFill>
-                  <a:srgbClr val="00B0F0"/>
-                </a:solidFill>
-              </a:rPr>
-              <a:t>int</a:t>
-            </a:r>
-            <a:r>
-              <a:rPr lang="en-US" altLang="ja-JP" sz="1400" dirty="0">
-                <a:solidFill>
-                  <a:srgbClr val="00B0F0"/>
-                </a:solidFill>
-              </a:rPr>
-              <a:t> hslb_crc16_error_bit; </a:t>
-            </a:r>
-            <a:r>
-              <a:rPr lang="en-US" altLang="ja-JP" sz="1400" dirty="0"/>
-              <a:t>// 4bit </a:t>
-            </a:r>
-            <a:r>
-              <a:rPr lang="en-US" altLang="ja-JP" sz="1400" dirty="0" err="1"/>
-              <a:t>errorflag</a:t>
-            </a:r>
-            <a:r>
-              <a:rPr lang="en-US" altLang="ja-JP" sz="1400" dirty="0"/>
-              <a:t> for CRC errors in data transfer via b2link. ( bit0,1,2,3 -&gt; finesse slot </a:t>
-            </a:r>
-            <a:r>
-              <a:rPr lang="en-US" altLang="ja-JP" sz="1400" dirty="0" err="1"/>
-              <a:t>a,b,c,d</a:t>
-            </a:r>
-            <a:r>
-              <a:rPr lang="en-US" altLang="ja-JP" sz="1400" dirty="0"/>
-              <a:t>)</a:t>
-            </a:r>
-          </a:p>
-          <a:p>
-            <a:r>
-              <a:rPr lang="en-US" altLang="ja-JP" sz="1400" dirty="0">
-                <a:solidFill>
-                  <a:srgbClr val="00B0F0"/>
-                </a:solidFill>
-              </a:rPr>
-              <a:t>    unsigned </a:t>
-            </a:r>
-            <a:r>
-              <a:rPr lang="en-US" altLang="ja-JP" sz="1400" dirty="0" err="1">
-                <a:solidFill>
-                  <a:srgbClr val="00B0F0"/>
-                </a:solidFill>
-              </a:rPr>
-              <a:t>int</a:t>
-            </a:r>
-            <a:r>
-              <a:rPr lang="en-US" altLang="ja-JP" sz="1400" dirty="0">
-                <a:solidFill>
-                  <a:srgbClr val="00B0F0"/>
-                </a:solidFill>
-              </a:rPr>
-              <a:t> </a:t>
-            </a:r>
-            <a:r>
-              <a:rPr lang="en-US" altLang="ja-JP" sz="1400" dirty="0" err="1">
-                <a:solidFill>
-                  <a:srgbClr val="00B0F0"/>
-                </a:solidFill>
-              </a:rPr>
-              <a:t>truncation_mask</a:t>
-            </a:r>
-            <a:r>
-              <a:rPr lang="en-US" altLang="ja-JP" sz="1400" dirty="0">
-                <a:solidFill>
-                  <a:srgbClr val="00B0F0"/>
-                </a:solidFill>
-              </a:rPr>
-              <a:t>; </a:t>
-            </a:r>
-            <a:r>
-              <a:rPr lang="en-US" altLang="ja-JP" sz="1400" dirty="0"/>
-              <a:t>// Not defined yet</a:t>
-            </a:r>
-          </a:p>
-          <a:p>
-            <a:r>
-              <a:rPr lang="en-US" altLang="ja-JP" sz="1400" dirty="0">
-                <a:solidFill>
-                  <a:srgbClr val="00B0F0"/>
-                </a:solidFill>
-              </a:rPr>
-              <a:t>    unsigned </a:t>
-            </a:r>
-            <a:r>
-              <a:rPr lang="en-US" altLang="ja-JP" sz="1400" dirty="0" err="1">
-                <a:solidFill>
-                  <a:srgbClr val="00B0F0"/>
-                </a:solidFill>
-              </a:rPr>
-              <a:t>int</a:t>
-            </a:r>
-            <a:r>
-              <a:rPr lang="en-US" altLang="ja-JP" sz="1400" dirty="0">
-                <a:solidFill>
-                  <a:srgbClr val="00B0F0"/>
-                </a:solidFill>
-              </a:rPr>
-              <a:t> </a:t>
-            </a:r>
-            <a:r>
-              <a:rPr lang="en-US" altLang="ja-JP" sz="1400" dirty="0" err="1">
-                <a:solidFill>
-                  <a:srgbClr val="00B0F0"/>
-                </a:solidFill>
-              </a:rPr>
-              <a:t>type_of_data</a:t>
-            </a:r>
-            <a:r>
-              <a:rPr lang="en-US" altLang="ja-JP" sz="1400" dirty="0">
-                <a:solidFill>
-                  <a:srgbClr val="00B0F0"/>
-                </a:solidFill>
-              </a:rPr>
-              <a:t>; </a:t>
-            </a:r>
-            <a:r>
-              <a:rPr lang="en-US" altLang="ja-JP" sz="1400" dirty="0"/>
-              <a:t>// Not defined yet</a:t>
-            </a:r>
-          </a:p>
-          <a:p>
-            <a:r>
-              <a:rPr lang="en-US" altLang="ja-JP" sz="1400" dirty="0">
-                <a:solidFill>
-                  <a:srgbClr val="00B0F0"/>
-                </a:solidFill>
-              </a:rPr>
-              <a:t>  };</a:t>
-            </a:r>
-            <a:endParaRPr lang="en-US" altLang="ja-JP" sz="1400" dirty="0">
-              <a:solidFill>
-                <a:srgbClr val="00B0F0"/>
-              </a:solidFill>
-            </a:endParaRPr>
-          </a:p>
-        </p:txBody>
-      </p:sp>
-      <p:sp>
-        <p:nvSpPr>
-          <p:cNvPr id="6" name="正方形/長方形 5"/>
-          <p:cNvSpPr/>
-          <p:nvPr/>
-        </p:nvSpPr>
-        <p:spPr>
-          <a:xfrm>
-            <a:off x="6451245" y="6488668"/>
-            <a:ext cx="5395708" cy="369332"/>
-          </a:xfrm>
-          <a:prstGeom prst="rect">
-            <a:avLst/>
-          </a:prstGeom>
-        </p:spPr>
-        <p:txBody>
-          <a:bodyPr wrap="none">
-            <a:spAutoFit/>
-          </a:bodyPr>
-          <a:lstStyle/>
+          <a:lstStyle>
+            <a:lvl1pPr algn="l" defTabSz="914400" rtl="0" eaLnBrk="1" latinLnBrk="0" hangingPunct="1">
+              <a:lnSpc>
+                <a:spcPct val="90000"/>
+              </a:lnSpc>
+              <a:spcBef>
+                <a:spcPct val="0"/>
+              </a:spcBef>
+              <a:buNone/>
+              <a:defRPr kumimoji="1" sz="4400" kern="1200">
+                <a:solidFill>
+                  <a:schemeClr val="tx1"/>
+                </a:solidFill>
+                <a:latin typeface="+mj-lt"/>
+                <a:ea typeface="+mj-ea"/>
+                <a:cs typeface="+mj-cs"/>
+              </a:defRPr>
+            </a:lvl1pPr>
+          </a:lstStyle>
           <a:p>
             <a:r>
               <a:rPr lang="en-US" altLang="ja-JP" dirty="0"/>
-              <a:t>(#include &lt;</a:t>
-            </a:r>
-            <a:r>
-              <a:rPr lang="en-US" altLang="ja-JP" dirty="0" err="1"/>
-              <a:t>rawdata</a:t>
-            </a:r>
-            <a:r>
-              <a:rPr lang="en-US" altLang="ja-JP" dirty="0"/>
-              <a:t>/include/</a:t>
-            </a:r>
-            <a:r>
-              <a:rPr lang="en-US" altLang="ja-JP" dirty="0" err="1"/>
-              <a:t>RawCOPPERPackerInfo.h</a:t>
-            </a:r>
-            <a:r>
-              <a:rPr lang="en-US" altLang="ja-JP" dirty="0"/>
-              <a:t>&gt; )</a:t>
-            </a:r>
-            <a:endParaRPr lang="en-US" altLang="ja-JP" dirty="0"/>
+              <a:t>2</a:t>
+            </a:r>
+            <a:r>
+              <a:rPr lang="en-US" altLang="ja-JP" dirty="0" smtClean="0"/>
+              <a:t>, Packer</a:t>
+            </a:r>
+            <a:endParaRPr lang="ja-JP" altLang="en-US" dirty="0"/>
           </a:p>
         </p:txBody>
       </p:sp>
     </p:spTree>
     <p:extLst>
       <p:ext uri="{BB962C8B-B14F-4D97-AF65-F5344CB8AC3E}">
-        <p14:creationId xmlns:p14="http://schemas.microsoft.com/office/powerpoint/2010/main" val="1279870650"/>
+        <p14:creationId xmlns:p14="http://schemas.microsoft.com/office/powerpoint/2010/main" val="1787463662"/>
       </p:ext>
     </p:extLst>
   </p:cSld>
@@ -6401,6 +6162,42 @@
       </p:grpSpPr>
       <p:sp>
         <p:nvSpPr>
+          <p:cNvPr id="2" name="タイトル 1"/>
+          <p:cNvSpPr>
+            <a:spLocks noGrp="1"/>
+          </p:cNvSpPr>
+          <p:nvPr>
+            <p:ph type="title"/>
+          </p:nvPr>
+        </p:nvSpPr>
+        <p:spPr>
+          <a:xfrm>
+            <a:off x="91371" y="0"/>
+            <a:ext cx="11319165" cy="771771"/>
+          </a:xfrm>
+        </p:spPr>
+        <p:txBody>
+          <a:bodyPr/>
+          <a:lstStyle/>
+          <a:p>
+            <a:r>
+              <a:rPr lang="en-US" altLang="ja-JP" u="sng" dirty="0" smtClean="0"/>
+              <a:t>2-1, Function to store data in </a:t>
+            </a:r>
+            <a:r>
+              <a:rPr lang="en-US" altLang="ja-JP" u="sng" dirty="0" err="1" smtClean="0"/>
+              <a:t>RawCOPPER</a:t>
+            </a:r>
+            <a:r>
+              <a:rPr lang="en-US" altLang="ja-JP" u="sng" dirty="0" smtClean="0"/>
+              <a:t> object</a:t>
+            </a:r>
+            <a:endParaRPr kumimoji="1" lang="ja-JP" altLang="en-US" u="sng" dirty="0"/>
+          </a:p>
+        </p:txBody>
+      </p:sp>
+      <p:sp>
+        <p:nvSpPr>
           <p:cNvPr id="3" name="コンテンツ プレースホルダー 2"/>
           <p:cNvSpPr>
             <a:spLocks noGrp="1"/>
@@ -6411,51 +6208,170 @@
         </p:nvSpPr>
         <p:spPr>
           <a:xfrm>
-            <a:off x="493153" y="1052893"/>
-            <a:ext cx="10515600" cy="4351338"/>
+            <a:off x="91371" y="1890465"/>
+            <a:ext cx="6391923" cy="2011834"/>
           </a:xfrm>
+          <a:ln>
+            <a:solidFill>
+              <a:schemeClr val="accent1">
+                <a:lumMod val="40000"/>
+                <a:lumOff val="60000"/>
+              </a:schemeClr>
+            </a:solidFill>
+          </a:ln>
         </p:spPr>
         <p:txBody>
-          <a:bodyPr/>
+          <a:bodyPr>
+            <a:normAutofit/>
+          </a:bodyPr>
           <a:lstStyle/>
           <a:p>
-            <a:pPr>
-              <a:buFont typeface="Wingdings" panose="05000000000000000000" pitchFamily="2" charset="2"/>
-              <a:buChar char="Ø"/>
+            <a:pPr marL="0" indent="0">
+              <a:buNone/>
             </a:pPr>
             <a:r>
-              <a:rPr lang="en-US" altLang="ja-JP" dirty="0" smtClean="0"/>
-              <a:t> Module to fill dummy data in </a:t>
-            </a:r>
-            <a:r>
-              <a:rPr lang="en-US" altLang="ja-JP" dirty="0" err="1" smtClean="0"/>
-              <a:t>RawCOPPER</a:t>
-            </a:r>
-            <a:endParaRPr lang="en-US" altLang="ja-JP" dirty="0" smtClean="0"/>
+              <a:rPr lang="en-US" altLang="ja-JP" sz="1600" dirty="0" smtClean="0"/>
+              <a:t>Input variables :</a:t>
+            </a:r>
+            <a:endParaRPr kumimoji="1" lang="en-US" altLang="ja-JP" sz="1600" dirty="0" smtClean="0"/>
           </a:p>
           <a:p>
             <a:pPr marL="0" indent="0">
               <a:buNone/>
             </a:pPr>
             <a:r>
-              <a:rPr lang="en-US" altLang="ja-JP" dirty="0" smtClean="0"/>
-              <a:t>- rawdata/modules/src/DummyDataPacker.cc</a:t>
+              <a:rPr lang="en-US" altLang="ja-JP" sz="1600" dirty="0" err="1" smtClean="0">
+                <a:solidFill>
+                  <a:srgbClr val="FF0000"/>
+                </a:solidFill>
+              </a:rPr>
+              <a:t>int</a:t>
+            </a:r>
+            <a:r>
+              <a:rPr lang="en-US" altLang="ja-JP" sz="1600" dirty="0" smtClean="0">
+                <a:solidFill>
+                  <a:srgbClr val="FF0000"/>
+                </a:solidFill>
+              </a:rPr>
+              <a:t>* </a:t>
+            </a:r>
+            <a:r>
+              <a:rPr lang="en-US" altLang="ja-JP" sz="1600" dirty="0" err="1" smtClean="0">
+                <a:solidFill>
+                  <a:srgbClr val="FF0000"/>
+                </a:solidFill>
+              </a:rPr>
+              <a:t>detector_buf</a:t>
+            </a:r>
+            <a:r>
+              <a:rPr lang="en-US" altLang="ja-JP" sz="1600" dirty="0" smtClean="0">
+                <a:solidFill>
+                  <a:srgbClr val="FF0000"/>
+                </a:solidFill>
+              </a:rPr>
+              <a:t>_*** </a:t>
+            </a:r>
+            <a:r>
+              <a:rPr lang="en-US" altLang="ja-JP" sz="1600" dirty="0" smtClean="0"/>
+              <a:t>: pointer to the detector buffer that you want to store as ***</a:t>
+            </a:r>
+            <a:r>
+              <a:rPr lang="en-US" altLang="ja-JP" sz="1600" dirty="0" err="1" smtClean="0"/>
+              <a:t>th</a:t>
+            </a:r>
+            <a:r>
+              <a:rPr lang="en-US" altLang="ja-JP" sz="1600" dirty="0" smtClean="0"/>
+              <a:t> FINESSE data.</a:t>
             </a:r>
           </a:p>
           <a:p>
             <a:pPr marL="0" indent="0">
               <a:buNone/>
             </a:pPr>
-            <a:endParaRPr lang="en-US" altLang="ja-JP" dirty="0"/>
-          </a:p>
-          <a:p>
-            <a:pPr>
-              <a:buFont typeface="Wingdings" panose="05000000000000000000" pitchFamily="2" charset="2"/>
-              <a:buChar char="Ø"/>
+            <a:r>
+              <a:rPr lang="en-US" altLang="ja-JP" sz="1600" dirty="0" err="1">
+                <a:solidFill>
+                  <a:srgbClr val="FF0000"/>
+                </a:solidFill>
+              </a:rPr>
+              <a:t>i</a:t>
+            </a:r>
+            <a:r>
+              <a:rPr kumimoji="1" lang="en-US" altLang="ja-JP" sz="1600" dirty="0" err="1" smtClean="0">
+                <a:solidFill>
+                  <a:srgbClr val="FF0000"/>
+                </a:solidFill>
+              </a:rPr>
+              <a:t>nt</a:t>
+            </a:r>
+            <a:r>
+              <a:rPr kumimoji="1" lang="en-US" altLang="ja-JP" sz="1600" dirty="0" smtClean="0">
+                <a:solidFill>
+                  <a:srgbClr val="FF0000"/>
+                </a:solidFill>
+              </a:rPr>
+              <a:t> </a:t>
+            </a:r>
+            <a:r>
+              <a:rPr kumimoji="1" lang="en-US" altLang="ja-JP" sz="1600" dirty="0" err="1" smtClean="0">
+                <a:solidFill>
+                  <a:srgbClr val="FF0000"/>
+                </a:solidFill>
+              </a:rPr>
+              <a:t>nwords</a:t>
+            </a:r>
+            <a:r>
+              <a:rPr kumimoji="1" lang="en-US" altLang="ja-JP" sz="1600" dirty="0" smtClean="0">
+                <a:solidFill>
+                  <a:srgbClr val="FF0000"/>
+                </a:solidFill>
+              </a:rPr>
+              <a:t>_*** </a:t>
+            </a:r>
+            <a:r>
+              <a:rPr kumimoji="1" lang="en-US" altLang="ja-JP" sz="1600" dirty="0" smtClean="0"/>
+              <a:t>: length of the </a:t>
+            </a:r>
+            <a:r>
+              <a:rPr kumimoji="1" lang="en-US" altLang="ja-JP" sz="1600" dirty="0" err="1" smtClean="0"/>
+              <a:t>detector_buf</a:t>
+            </a:r>
+            <a:r>
+              <a:rPr kumimoji="1" lang="en-US" altLang="ja-JP" sz="1600" dirty="0" smtClean="0"/>
+              <a:t>_***  (unit -&gt; word = 4bytes )</a:t>
+            </a:r>
+          </a:p>
+          <a:p>
+            <a:pPr marL="0" indent="0">
+              <a:buNone/>
             </a:pPr>
             <a:r>
-              <a:rPr lang="en-US" altLang="ja-JP" dirty="0" smtClean="0"/>
-              <a:t> Script to run the above module</a:t>
+              <a:rPr lang="en-US" altLang="ja-JP" sz="1600" dirty="0" err="1" smtClean="0">
+                <a:solidFill>
+                  <a:srgbClr val="FF0000"/>
+                </a:solidFill>
+              </a:rPr>
+              <a:t>RawCOPPERPackerInfo</a:t>
+            </a:r>
+            <a:r>
+              <a:rPr lang="en-US" altLang="ja-JP" sz="1600" dirty="0" smtClean="0">
+                <a:solidFill>
+                  <a:srgbClr val="FF0000"/>
+                </a:solidFill>
+              </a:rPr>
+              <a:t> </a:t>
+            </a:r>
+            <a:r>
+              <a:rPr lang="en-US" altLang="ja-JP" sz="1600" dirty="0" err="1" smtClean="0">
+                <a:solidFill>
+                  <a:srgbClr val="FF0000"/>
+                </a:solidFill>
+              </a:rPr>
+              <a:t>rawcprpacker_info</a:t>
+            </a:r>
+            <a:r>
+              <a:rPr lang="en-US" altLang="ja-JP" sz="1600" dirty="0" smtClean="0"/>
+              <a:t> : Information to</a:t>
             </a:r>
           </a:p>
           <a:p>
@@ -6463,78 +6379,794 @@
               <a:buNone/>
             </a:pPr>
             <a:r>
-              <a:rPr lang="en-US" altLang="ja-JP" dirty="0" smtClean="0"/>
-              <a:t>- $ </a:t>
-            </a:r>
-            <a:r>
-              <a:rPr lang="en-US" altLang="ja-JP" dirty="0"/>
-              <a:t>rawdata/scripts/DummyDataPacker.py</a:t>
-            </a:r>
-            <a:endParaRPr kumimoji="1" lang="ja-JP" altLang="en-US" dirty="0"/>
-          </a:p>
-        </p:txBody>
-      </p:sp>
-      <p:sp>
-        <p:nvSpPr>
-          <p:cNvPr id="4" name="タイトル 1"/>
-          <p:cNvSpPr txBox="1">
-            <a:spLocks/>
-          </p:cNvSpPr>
+              <a:rPr lang="en-US" altLang="ja-JP" sz="1600" dirty="0"/>
+              <a:t> fill </a:t>
+            </a:r>
+            <a:r>
+              <a:rPr lang="en-US" altLang="ja-JP" sz="1600" dirty="0" err="1" smtClean="0"/>
+              <a:t>RawHeader</a:t>
+            </a:r>
+            <a:endParaRPr lang="en-US" altLang="ja-JP" sz="1600" dirty="0"/>
+          </a:p>
+        </p:txBody>
+      </p:sp>
+      <p:sp>
+        <p:nvSpPr>
+          <p:cNvPr id="4" name="正方形/長方形 3"/>
+          <p:cNvSpPr/>
           <p:nvPr/>
         </p:nvSpPr>
         <p:spPr>
           <a:xfrm>
-            <a:off x="91371" y="0"/>
-            <a:ext cx="11319165" cy="771771"/>
+            <a:off x="91371" y="771771"/>
+            <a:ext cx="12067505" cy="1015663"/>
           </a:xfrm>
           <a:prstGeom prst="rect">
             <a:avLst/>
           </a:prstGeom>
         </p:spPr>
         <p:txBody>
-          <a:bodyPr vert="horz" lIns="91440" tIns="45720" rIns="91440" bIns="45720" rtlCol="0" anchor="ctr">
-            <a:normAutofit fontScale="92500"/>
+          <a:bodyPr wrap="square">
+            <a:spAutoFit/>
           </a:bodyPr>
-          <a:lstStyle>
-            <a:lvl1pPr algn="l" defTabSz="914400" rtl="0" eaLnBrk="1" latinLnBrk="0" hangingPunct="1">
-              <a:lnSpc>
-                <a:spcPct val="90000"/>
-              </a:lnSpc>
-              <a:spcBef>
-                <a:spcPct val="0"/>
-              </a:spcBef>
-              <a:buNone/>
-              <a:defRPr kumimoji="1" sz="4400" kern="1200">
-                <a:solidFill>
-                  <a:schemeClr val="tx1"/>
-                </a:solidFill>
-                <a:latin typeface="+mj-lt"/>
-                <a:ea typeface="+mj-ea"/>
-                <a:cs typeface="+mj-cs"/>
-              </a:defRPr>
-            </a:lvl1pPr>
-          </a:lstStyle>
-          <a:p>
-            <a:r>
-              <a:rPr lang="en-US" altLang="ja-JP" u="sng" dirty="0" smtClean="0"/>
-              <a:t>2-2, test program to store data in </a:t>
-            </a:r>
-            <a:r>
-              <a:rPr lang="en-US" altLang="ja-JP" u="sng" dirty="0" err="1" smtClean="0"/>
+          <a:lstStyle/>
+          <a:p>
+            <a:r>
+              <a:rPr lang="en-US" altLang="ja-JP" sz="2000" dirty="0">
+                <a:solidFill>
+                  <a:srgbClr val="00B050"/>
+                </a:solidFill>
+              </a:rPr>
+              <a:t>void </a:t>
+            </a:r>
+            <a:r>
+              <a:rPr lang="en-US" altLang="ja-JP" sz="2000" dirty="0" err="1">
+                <a:solidFill>
+                  <a:srgbClr val="00B050"/>
+                </a:solidFill>
+              </a:rPr>
               <a:t>RawCOPPER</a:t>
             </a:r>
             <a:r>
-              <a:rPr lang="en-US" altLang="ja-JP" u="sng" dirty="0" smtClean="0"/>
-              <a:t> object</a:t>
-            </a:r>
-            <a:endParaRPr lang="ja-JP" altLang="en-US" u="sng" dirty="0"/>
+              <a:rPr lang="en-US" altLang="ja-JP" sz="2000" dirty="0">
+                <a:solidFill>
+                  <a:srgbClr val="00B050"/>
+                </a:solidFill>
+              </a:rPr>
+              <a:t>::</a:t>
+            </a:r>
+            <a:r>
+              <a:rPr lang="en-US" altLang="ja-JP" sz="2000" dirty="0" err="1">
+                <a:solidFill>
+                  <a:srgbClr val="00B050"/>
+                </a:solidFill>
+              </a:rPr>
+              <a:t>PackDetectorBuf</a:t>
+            </a:r>
+            <a:r>
+              <a:rPr lang="en-US" altLang="ja-JP" sz="2000" dirty="0">
+                <a:solidFill>
+                  <a:srgbClr val="00B050"/>
+                </a:solidFill>
+              </a:rPr>
+              <a:t>(  </a:t>
+            </a:r>
+            <a:r>
+              <a:rPr lang="en-US" altLang="ja-JP" sz="2000" dirty="0" err="1"/>
+              <a:t>int</a:t>
+            </a:r>
+            <a:r>
+              <a:rPr lang="en-US" altLang="ja-JP" sz="2000" dirty="0"/>
+              <a:t>* detector_buf_1st, </a:t>
+            </a:r>
+            <a:r>
+              <a:rPr lang="en-US" altLang="ja-JP" sz="2000" dirty="0" err="1"/>
+              <a:t>int</a:t>
+            </a:r>
+            <a:r>
+              <a:rPr lang="en-US" altLang="ja-JP" sz="2000" dirty="0"/>
+              <a:t> nwords_1st,  </a:t>
+            </a:r>
+            <a:r>
+              <a:rPr lang="en-US" altLang="ja-JP" sz="2000" dirty="0" err="1"/>
+              <a:t>int</a:t>
+            </a:r>
+            <a:r>
+              <a:rPr lang="en-US" altLang="ja-JP" sz="2000" dirty="0"/>
+              <a:t>* detector_buf_2nd, </a:t>
+            </a:r>
+            <a:r>
+              <a:rPr lang="en-US" altLang="ja-JP" sz="2000" dirty="0" err="1"/>
+              <a:t>int</a:t>
+            </a:r>
+            <a:r>
+              <a:rPr lang="en-US" altLang="ja-JP" sz="2000" dirty="0"/>
+              <a:t> nwords_2nd</a:t>
+            </a:r>
+            <a:r>
+              <a:rPr lang="en-US" altLang="ja-JP" sz="2000" dirty="0" smtClean="0"/>
+              <a:t>,  </a:t>
+            </a:r>
+            <a:r>
+              <a:rPr lang="en-US" altLang="ja-JP" sz="2000" dirty="0" err="1"/>
+              <a:t>int</a:t>
+            </a:r>
+            <a:r>
+              <a:rPr lang="en-US" altLang="ja-JP" sz="2000" dirty="0"/>
+              <a:t>* detector_buf_3rd, </a:t>
+            </a:r>
+            <a:r>
+              <a:rPr lang="en-US" altLang="ja-JP" sz="2000" dirty="0" err="1"/>
+              <a:t>int</a:t>
+            </a:r>
+            <a:r>
+              <a:rPr lang="en-US" altLang="ja-JP" sz="2000" dirty="0"/>
+              <a:t> nwords_3rd,  </a:t>
+            </a:r>
+            <a:r>
+              <a:rPr lang="en-US" altLang="ja-JP" sz="2000" dirty="0" err="1"/>
+              <a:t>int</a:t>
+            </a:r>
+            <a:r>
+              <a:rPr lang="en-US" altLang="ja-JP" sz="2000" dirty="0"/>
+              <a:t>* detector_buf_4th, </a:t>
+            </a:r>
+            <a:r>
+              <a:rPr lang="en-US" altLang="ja-JP" sz="2000" dirty="0" err="1"/>
+              <a:t>int</a:t>
+            </a:r>
+            <a:r>
+              <a:rPr lang="en-US" altLang="ja-JP" sz="2000" dirty="0"/>
+              <a:t> nwords_4th,   </a:t>
+            </a:r>
+            <a:r>
+              <a:rPr lang="en-US" altLang="ja-JP" sz="2000" dirty="0" err="1"/>
+              <a:t>RawCOPPERPackerInfo</a:t>
+            </a:r>
+            <a:r>
+              <a:rPr lang="en-US" altLang="ja-JP" sz="2000" dirty="0"/>
+              <a:t>  </a:t>
+            </a:r>
+            <a:r>
+              <a:rPr lang="en-US" altLang="ja-JP" sz="2000" dirty="0" err="1"/>
+              <a:t>rawcprpacker_info</a:t>
+            </a:r>
+            <a:r>
+              <a:rPr lang="en-US" altLang="ja-JP" sz="2000" dirty="0"/>
+              <a:t> </a:t>
+            </a:r>
+            <a:r>
+              <a:rPr lang="en-US" altLang="ja-JP" sz="2000" dirty="0">
+                <a:solidFill>
+                  <a:srgbClr val="00B050"/>
+                </a:solidFill>
+              </a:rPr>
+              <a:t>){}</a:t>
+            </a:r>
+          </a:p>
+        </p:txBody>
+      </p:sp>
+      <p:sp>
+        <p:nvSpPr>
+          <p:cNvPr id="5" name="正方形/長方形 4"/>
+          <p:cNvSpPr/>
+          <p:nvPr/>
+        </p:nvSpPr>
+        <p:spPr>
+          <a:xfrm>
+            <a:off x="5750953" y="3085588"/>
+            <a:ext cx="6096000" cy="3539430"/>
+          </a:xfrm>
+          <a:prstGeom prst="rect">
+            <a:avLst/>
+          </a:prstGeom>
+          <a:ln>
+            <a:solidFill>
+              <a:schemeClr val="accent6">
+                <a:lumMod val="75000"/>
+              </a:schemeClr>
+            </a:solidFill>
+          </a:ln>
+        </p:spPr>
+        <p:txBody>
+          <a:bodyPr>
+            <a:spAutoFit/>
+          </a:bodyPr>
+          <a:lstStyle/>
+          <a:p>
+            <a:r>
+              <a:rPr lang="en-US" altLang="ja-JP" sz="1400" dirty="0">
+                <a:solidFill>
+                  <a:srgbClr val="00B0F0"/>
+                </a:solidFill>
+              </a:rPr>
+              <a:t> </a:t>
+            </a:r>
+            <a:r>
+              <a:rPr lang="en-US" altLang="ja-JP" sz="1400" dirty="0" err="1">
+                <a:solidFill>
+                  <a:srgbClr val="00B0F0"/>
+                </a:solidFill>
+              </a:rPr>
+              <a:t>struct</a:t>
+            </a:r>
+            <a:r>
+              <a:rPr lang="en-US" altLang="ja-JP" sz="1400" dirty="0">
+                <a:solidFill>
+                  <a:srgbClr val="00B0F0"/>
+                </a:solidFill>
+              </a:rPr>
+              <a:t> </a:t>
+            </a:r>
+            <a:r>
+              <a:rPr lang="en-US" altLang="ja-JP" sz="1400" dirty="0" err="1">
+                <a:solidFill>
+                  <a:srgbClr val="00B0F0"/>
+                </a:solidFill>
+              </a:rPr>
+              <a:t>RawCOPPERPackerInfo</a:t>
+            </a:r>
+            <a:r>
+              <a:rPr lang="en-US" altLang="ja-JP" sz="1400" dirty="0">
+                <a:solidFill>
+                  <a:srgbClr val="00B0F0"/>
+                </a:solidFill>
+              </a:rPr>
+              <a:t> {</a:t>
+            </a:r>
+          </a:p>
+          <a:p>
+            <a:r>
+              <a:rPr lang="en-US" altLang="ja-JP" sz="1400" dirty="0">
+                <a:solidFill>
+                  <a:srgbClr val="00B0F0"/>
+                </a:solidFill>
+              </a:rPr>
+              <a:t>    unsigned </a:t>
+            </a:r>
+            <a:r>
+              <a:rPr lang="en-US" altLang="ja-JP" sz="1400" dirty="0" err="1">
+                <a:solidFill>
+                  <a:srgbClr val="00B0F0"/>
+                </a:solidFill>
+              </a:rPr>
+              <a:t>int</a:t>
+            </a:r>
+            <a:r>
+              <a:rPr lang="en-US" altLang="ja-JP" sz="1400" dirty="0">
+                <a:solidFill>
+                  <a:srgbClr val="00B0F0"/>
+                </a:solidFill>
+              </a:rPr>
+              <a:t> </a:t>
+            </a:r>
+            <a:r>
+              <a:rPr lang="en-US" altLang="ja-JP" sz="1400" dirty="0" err="1">
+                <a:solidFill>
+                  <a:srgbClr val="00B0F0"/>
+                </a:solidFill>
+              </a:rPr>
+              <a:t>exp_num</a:t>
+            </a:r>
+            <a:r>
+              <a:rPr lang="en-US" altLang="ja-JP" sz="1400" dirty="0">
+                <a:solidFill>
+                  <a:srgbClr val="00B0F0"/>
+                </a:solidFill>
+              </a:rPr>
+              <a:t>; </a:t>
+            </a:r>
+            <a:r>
+              <a:rPr lang="en-US" altLang="ja-JP" sz="1400" dirty="0"/>
+              <a:t>// 10bit</a:t>
+            </a:r>
+          </a:p>
+          <a:p>
+            <a:r>
+              <a:rPr lang="en-US" altLang="ja-JP" sz="1400" dirty="0">
+                <a:solidFill>
+                  <a:srgbClr val="00B0F0"/>
+                </a:solidFill>
+              </a:rPr>
+              <a:t>    unsigned </a:t>
+            </a:r>
+            <a:r>
+              <a:rPr lang="en-US" altLang="ja-JP" sz="1400" dirty="0" err="1">
+                <a:solidFill>
+                  <a:srgbClr val="00B0F0"/>
+                </a:solidFill>
+              </a:rPr>
+              <a:t>int</a:t>
+            </a:r>
+            <a:r>
+              <a:rPr lang="en-US" altLang="ja-JP" sz="1400" dirty="0">
+                <a:solidFill>
+                  <a:srgbClr val="00B0F0"/>
+                </a:solidFill>
+              </a:rPr>
+              <a:t> </a:t>
+            </a:r>
+            <a:r>
+              <a:rPr lang="en-US" altLang="ja-JP" sz="1400" dirty="0" err="1">
+                <a:solidFill>
+                  <a:srgbClr val="00B0F0"/>
+                </a:solidFill>
+              </a:rPr>
+              <a:t>run_subrun_num</a:t>
+            </a:r>
+            <a:r>
+              <a:rPr lang="en-US" altLang="ja-JP" sz="1400" dirty="0">
+                <a:solidFill>
+                  <a:srgbClr val="00B0F0"/>
+                </a:solidFill>
+              </a:rPr>
+              <a:t>; </a:t>
+            </a:r>
+            <a:r>
+              <a:rPr lang="en-US" altLang="ja-JP" sz="1400" dirty="0"/>
+              <a:t>// 22bit</a:t>
+            </a:r>
+          </a:p>
+          <a:p>
+            <a:r>
+              <a:rPr lang="en-US" altLang="ja-JP" sz="1400" dirty="0">
+                <a:solidFill>
+                  <a:srgbClr val="00B0F0"/>
+                </a:solidFill>
+              </a:rPr>
+              <a:t>    unsigned </a:t>
+            </a:r>
+            <a:r>
+              <a:rPr lang="en-US" altLang="ja-JP" sz="1400" dirty="0" err="1">
+                <a:solidFill>
+                  <a:srgbClr val="00B0F0"/>
+                </a:solidFill>
+              </a:rPr>
+              <a:t>int</a:t>
+            </a:r>
+            <a:r>
+              <a:rPr lang="en-US" altLang="ja-JP" sz="1400" dirty="0">
+                <a:solidFill>
+                  <a:srgbClr val="00B0F0"/>
+                </a:solidFill>
+              </a:rPr>
+              <a:t> </a:t>
+            </a:r>
+            <a:r>
+              <a:rPr lang="en-US" altLang="ja-JP" sz="1400" dirty="0" err="1">
+                <a:solidFill>
+                  <a:srgbClr val="00B0F0"/>
+                </a:solidFill>
+              </a:rPr>
+              <a:t>eve_num</a:t>
+            </a:r>
+            <a:r>
+              <a:rPr lang="en-US" altLang="ja-JP" sz="1400" dirty="0">
+                <a:solidFill>
+                  <a:srgbClr val="00B0F0"/>
+                </a:solidFill>
+              </a:rPr>
+              <a:t>; </a:t>
+            </a:r>
+            <a:r>
+              <a:rPr lang="en-US" altLang="ja-JP" sz="1400" dirty="0"/>
+              <a:t>// 32bit</a:t>
+            </a:r>
+          </a:p>
+          <a:p>
+            <a:r>
+              <a:rPr lang="en-US" altLang="ja-JP" sz="1400" dirty="0" smtClean="0">
+                <a:solidFill>
+                  <a:srgbClr val="00B0F0"/>
+                </a:solidFill>
+              </a:rPr>
+              <a:t>    unsigned </a:t>
+            </a:r>
+            <a:r>
+              <a:rPr lang="en-US" altLang="ja-JP" sz="1400" dirty="0" err="1" smtClean="0">
+                <a:solidFill>
+                  <a:srgbClr val="00B0F0"/>
+                </a:solidFill>
+              </a:rPr>
+              <a:t>int</a:t>
+            </a:r>
+            <a:r>
+              <a:rPr lang="en-US" altLang="ja-JP" sz="1400" dirty="0" smtClean="0">
+                <a:solidFill>
+                  <a:srgbClr val="00B0F0"/>
+                </a:solidFill>
+              </a:rPr>
+              <a:t> </a:t>
+            </a:r>
+            <a:r>
+              <a:rPr lang="en-US" altLang="ja-JP" sz="1400" dirty="0" err="1" smtClean="0">
+                <a:solidFill>
+                  <a:srgbClr val="00B0F0"/>
+                </a:solidFill>
+              </a:rPr>
+              <a:t>node_id</a:t>
+            </a:r>
+            <a:r>
+              <a:rPr lang="en-US" altLang="ja-JP" sz="1400" dirty="0" smtClean="0">
+                <a:solidFill>
+                  <a:srgbClr val="00B0F0"/>
+                </a:solidFill>
+              </a:rPr>
+              <a:t>; </a:t>
+            </a:r>
+            <a:r>
+              <a:rPr lang="en-US" altLang="ja-JP" sz="1400" dirty="0" smtClean="0"/>
+              <a:t>// 32bit</a:t>
+            </a:r>
+          </a:p>
+          <a:p>
+            <a:r>
+              <a:rPr lang="en-US" altLang="ja-JP" sz="1400" dirty="0" smtClean="0">
+                <a:solidFill>
+                  <a:srgbClr val="00B0F0"/>
+                </a:solidFill>
+              </a:rPr>
+              <a:t>    </a:t>
+            </a:r>
+            <a:r>
+              <a:rPr lang="en-US" altLang="ja-JP" sz="1400" dirty="0">
+                <a:solidFill>
+                  <a:srgbClr val="00B0F0"/>
+                </a:solidFill>
+              </a:rPr>
+              <a:t>unsigned </a:t>
+            </a:r>
+            <a:r>
+              <a:rPr lang="en-US" altLang="ja-JP" sz="1400" dirty="0" err="1">
+                <a:solidFill>
+                  <a:srgbClr val="00B0F0"/>
+                </a:solidFill>
+              </a:rPr>
+              <a:t>int</a:t>
+            </a:r>
+            <a:r>
+              <a:rPr lang="en-US" altLang="ja-JP" sz="1400" dirty="0">
+                <a:solidFill>
+                  <a:srgbClr val="00B0F0"/>
+                </a:solidFill>
+              </a:rPr>
+              <a:t> </a:t>
+            </a:r>
+            <a:r>
+              <a:rPr lang="en-US" altLang="ja-JP" sz="1400" dirty="0" err="1">
+                <a:solidFill>
+                  <a:srgbClr val="00B0F0"/>
+                </a:solidFill>
+              </a:rPr>
+              <a:t>tt_ctime</a:t>
+            </a:r>
+            <a:r>
+              <a:rPr lang="en-US" altLang="ja-JP" sz="1400" dirty="0">
+                <a:solidFill>
+                  <a:srgbClr val="00B0F0"/>
+                </a:solidFill>
+              </a:rPr>
+              <a:t>; </a:t>
+            </a:r>
+            <a:r>
+              <a:rPr lang="en-US" altLang="ja-JP" sz="1400" dirty="0" smtClean="0"/>
+              <a:t>// 27bit clock ticks at trigger timing distributed by FTSW. For details, see </a:t>
+            </a:r>
+            <a:r>
+              <a:rPr lang="en-US" altLang="ja-JP" sz="1400" dirty="0" err="1" smtClean="0"/>
+              <a:t>Nakao</a:t>
+            </a:r>
+            <a:r>
+              <a:rPr lang="en-US" altLang="ja-JP" sz="1400" dirty="0" smtClean="0"/>
+              <a:t>-san's belle2link user guide</a:t>
+            </a:r>
+          </a:p>
+          <a:p>
+            <a:r>
+              <a:rPr lang="en-US" altLang="ja-JP" sz="1400" dirty="0" smtClean="0">
+                <a:solidFill>
+                  <a:srgbClr val="00B0F0"/>
+                </a:solidFill>
+              </a:rPr>
+              <a:t>    unsigned </a:t>
+            </a:r>
+            <a:r>
+              <a:rPr lang="en-US" altLang="ja-JP" sz="1400" dirty="0" err="1" smtClean="0">
+                <a:solidFill>
+                  <a:srgbClr val="00B0F0"/>
+                </a:solidFill>
+              </a:rPr>
+              <a:t>int</a:t>
+            </a:r>
+            <a:r>
+              <a:rPr lang="en-US" altLang="ja-JP" sz="1400" dirty="0" smtClean="0">
+                <a:solidFill>
+                  <a:srgbClr val="00B0F0"/>
+                </a:solidFill>
+              </a:rPr>
+              <a:t> </a:t>
+            </a:r>
+            <a:r>
+              <a:rPr lang="en-US" altLang="ja-JP" sz="1400" dirty="0" err="1" smtClean="0">
+                <a:solidFill>
+                  <a:srgbClr val="00B0F0"/>
+                </a:solidFill>
+              </a:rPr>
+              <a:t>tt_utime</a:t>
+            </a:r>
+            <a:r>
+              <a:rPr lang="en-US" altLang="ja-JP" sz="1400" dirty="0" smtClean="0">
+                <a:solidFill>
+                  <a:srgbClr val="00B0F0"/>
+                </a:solidFill>
+              </a:rPr>
+              <a:t>; </a:t>
+            </a:r>
+            <a:r>
+              <a:rPr lang="en-US" altLang="ja-JP" sz="1400" dirty="0" smtClean="0"/>
+              <a:t>// 32bit </a:t>
+            </a:r>
+            <a:r>
+              <a:rPr lang="en-US" altLang="ja-JP" sz="1400" dirty="0" err="1" smtClean="0"/>
+              <a:t>unitx</a:t>
+            </a:r>
+            <a:r>
+              <a:rPr lang="en-US" altLang="ja-JP" sz="1400" dirty="0" smtClean="0"/>
+              <a:t> time at trigger timing distributed by FTSW. For details, see </a:t>
+            </a:r>
+            <a:r>
+              <a:rPr lang="en-US" altLang="ja-JP" sz="1400" dirty="0" err="1" smtClean="0"/>
+              <a:t>Nakao</a:t>
+            </a:r>
+            <a:r>
+              <a:rPr lang="en-US" altLang="ja-JP" sz="1400" dirty="0" smtClean="0"/>
+              <a:t>-san's belle2link user guide</a:t>
+            </a:r>
+          </a:p>
+          <a:p>
+            <a:r>
+              <a:rPr lang="en-US" altLang="ja-JP" sz="1400" dirty="0" smtClean="0">
+                <a:solidFill>
+                  <a:srgbClr val="00B0F0"/>
+                </a:solidFill>
+              </a:rPr>
+              <a:t>    </a:t>
+            </a:r>
+            <a:r>
+              <a:rPr lang="en-US" altLang="ja-JP" sz="1400" dirty="0">
+                <a:solidFill>
+                  <a:srgbClr val="00B0F0"/>
+                </a:solidFill>
+              </a:rPr>
+              <a:t>unsigned </a:t>
+            </a:r>
+            <a:r>
+              <a:rPr lang="en-US" altLang="ja-JP" sz="1400" dirty="0" err="1">
+                <a:solidFill>
+                  <a:srgbClr val="00B0F0"/>
+                </a:solidFill>
+              </a:rPr>
+              <a:t>int</a:t>
+            </a:r>
+            <a:r>
+              <a:rPr lang="en-US" altLang="ja-JP" sz="1400" dirty="0">
+                <a:solidFill>
+                  <a:srgbClr val="00B0F0"/>
+                </a:solidFill>
+              </a:rPr>
+              <a:t> b2l_ctime; </a:t>
+            </a:r>
+            <a:r>
+              <a:rPr lang="en-US" altLang="ja-JP" sz="1400" dirty="0"/>
+              <a:t>// 27bit clock ticks at trigger timing measured by HSLB on COPPER. For details, see </a:t>
+            </a:r>
+            <a:r>
+              <a:rPr lang="en-US" altLang="ja-JP" sz="1400" dirty="0" err="1"/>
+              <a:t>Nakao</a:t>
+            </a:r>
+            <a:r>
+              <a:rPr lang="en-US" altLang="ja-JP" sz="1400" dirty="0"/>
+              <a:t>-san's belle2link user guide</a:t>
+            </a:r>
+          </a:p>
+          <a:p>
+            <a:r>
+              <a:rPr lang="en-US" altLang="ja-JP" sz="1400" dirty="0">
+                <a:solidFill>
+                  <a:srgbClr val="00B0F0"/>
+                </a:solidFill>
+              </a:rPr>
+              <a:t>    unsigned </a:t>
+            </a:r>
+            <a:r>
+              <a:rPr lang="en-US" altLang="ja-JP" sz="1400" dirty="0" err="1">
+                <a:solidFill>
+                  <a:srgbClr val="00B0F0"/>
+                </a:solidFill>
+              </a:rPr>
+              <a:t>int</a:t>
+            </a:r>
+            <a:r>
+              <a:rPr lang="en-US" altLang="ja-JP" sz="1400" dirty="0">
+                <a:solidFill>
+                  <a:srgbClr val="00B0F0"/>
+                </a:solidFill>
+              </a:rPr>
+              <a:t> hslb_crc16_error_bit; </a:t>
+            </a:r>
+            <a:r>
+              <a:rPr lang="en-US" altLang="ja-JP" sz="1400" dirty="0"/>
+              <a:t>// 4bit </a:t>
+            </a:r>
+            <a:r>
+              <a:rPr lang="en-US" altLang="ja-JP" sz="1400" dirty="0" err="1"/>
+              <a:t>errorflag</a:t>
+            </a:r>
+            <a:r>
+              <a:rPr lang="en-US" altLang="ja-JP" sz="1400" dirty="0"/>
+              <a:t> for CRC errors in data transfer via b2link. ( bit0,1,2,3 -&gt; finesse slot </a:t>
+            </a:r>
+            <a:r>
+              <a:rPr lang="en-US" altLang="ja-JP" sz="1400" dirty="0" err="1"/>
+              <a:t>a,b,c,d</a:t>
+            </a:r>
+            <a:r>
+              <a:rPr lang="en-US" altLang="ja-JP" sz="1400" dirty="0"/>
+              <a:t>)</a:t>
+            </a:r>
+          </a:p>
+          <a:p>
+            <a:r>
+              <a:rPr lang="en-US" altLang="ja-JP" sz="1400" dirty="0">
+                <a:solidFill>
+                  <a:srgbClr val="00B0F0"/>
+                </a:solidFill>
+              </a:rPr>
+              <a:t>    unsigned </a:t>
+            </a:r>
+            <a:r>
+              <a:rPr lang="en-US" altLang="ja-JP" sz="1400" dirty="0" err="1">
+                <a:solidFill>
+                  <a:srgbClr val="00B0F0"/>
+                </a:solidFill>
+              </a:rPr>
+              <a:t>int</a:t>
+            </a:r>
+            <a:r>
+              <a:rPr lang="en-US" altLang="ja-JP" sz="1400" dirty="0">
+                <a:solidFill>
+                  <a:srgbClr val="00B0F0"/>
+                </a:solidFill>
+              </a:rPr>
+              <a:t> </a:t>
+            </a:r>
+            <a:r>
+              <a:rPr lang="en-US" altLang="ja-JP" sz="1400" dirty="0" err="1">
+                <a:solidFill>
+                  <a:srgbClr val="00B0F0"/>
+                </a:solidFill>
+              </a:rPr>
+              <a:t>truncation_mask</a:t>
+            </a:r>
+            <a:r>
+              <a:rPr lang="en-US" altLang="ja-JP" sz="1400" dirty="0">
+                <a:solidFill>
+                  <a:srgbClr val="00B0F0"/>
+                </a:solidFill>
+              </a:rPr>
+              <a:t>; </a:t>
+            </a:r>
+            <a:r>
+              <a:rPr lang="en-US" altLang="ja-JP" sz="1400" dirty="0"/>
+              <a:t>// Not defined yet</a:t>
+            </a:r>
+          </a:p>
+          <a:p>
+            <a:r>
+              <a:rPr lang="en-US" altLang="ja-JP" sz="1400" dirty="0">
+                <a:solidFill>
+                  <a:srgbClr val="00B0F0"/>
+                </a:solidFill>
+              </a:rPr>
+              <a:t>    unsigned </a:t>
+            </a:r>
+            <a:r>
+              <a:rPr lang="en-US" altLang="ja-JP" sz="1400" dirty="0" err="1">
+                <a:solidFill>
+                  <a:srgbClr val="00B0F0"/>
+                </a:solidFill>
+              </a:rPr>
+              <a:t>int</a:t>
+            </a:r>
+            <a:r>
+              <a:rPr lang="en-US" altLang="ja-JP" sz="1400" dirty="0">
+                <a:solidFill>
+                  <a:srgbClr val="00B0F0"/>
+                </a:solidFill>
+              </a:rPr>
+              <a:t> </a:t>
+            </a:r>
+            <a:r>
+              <a:rPr lang="en-US" altLang="ja-JP" sz="1400" dirty="0" err="1">
+                <a:solidFill>
+                  <a:srgbClr val="00B0F0"/>
+                </a:solidFill>
+              </a:rPr>
+              <a:t>type_of_data</a:t>
+            </a:r>
+            <a:r>
+              <a:rPr lang="en-US" altLang="ja-JP" sz="1400" dirty="0">
+                <a:solidFill>
+                  <a:srgbClr val="00B0F0"/>
+                </a:solidFill>
+              </a:rPr>
+              <a:t>; </a:t>
+            </a:r>
+            <a:r>
+              <a:rPr lang="en-US" altLang="ja-JP" sz="1400" dirty="0"/>
+              <a:t>// Not defined yet</a:t>
+            </a:r>
+          </a:p>
+          <a:p>
+            <a:r>
+              <a:rPr lang="en-US" altLang="ja-JP" sz="1400" dirty="0">
+                <a:solidFill>
+                  <a:srgbClr val="00B0F0"/>
+                </a:solidFill>
+              </a:rPr>
+              <a:t>  };</a:t>
+            </a:r>
+          </a:p>
+        </p:txBody>
+      </p:sp>
+      <p:sp>
+        <p:nvSpPr>
+          <p:cNvPr id="6" name="正方形/長方形 5"/>
+          <p:cNvSpPr/>
+          <p:nvPr/>
+        </p:nvSpPr>
+        <p:spPr>
+          <a:xfrm>
+            <a:off x="6451245" y="6488668"/>
+            <a:ext cx="5395708" cy="369332"/>
+          </a:xfrm>
+          <a:prstGeom prst="rect">
+            <a:avLst/>
+          </a:prstGeom>
+        </p:spPr>
+        <p:txBody>
+          <a:bodyPr wrap="none">
+            <a:spAutoFit/>
+          </a:bodyPr>
+          <a:lstStyle/>
+          <a:p>
+            <a:r>
+              <a:rPr lang="en-US" altLang="ja-JP" dirty="0"/>
+              <a:t>(#include &lt;</a:t>
+            </a:r>
+            <a:r>
+              <a:rPr lang="en-US" altLang="ja-JP" dirty="0" err="1"/>
+              <a:t>rawdata</a:t>
+            </a:r>
+            <a:r>
+              <a:rPr lang="en-US" altLang="ja-JP" dirty="0"/>
+              <a:t>/include/</a:t>
+            </a:r>
+            <a:r>
+              <a:rPr lang="en-US" altLang="ja-JP" dirty="0" err="1"/>
+              <a:t>RawCOPPERPackerInfo.h</a:t>
+            </a:r>
+            <a:r>
+              <a:rPr lang="en-US" altLang="ja-JP" dirty="0"/>
+              <a:t>&gt; )</a:t>
+            </a:r>
           </a:p>
         </p:txBody>
       </p:sp>
     </p:spTree>
     <p:extLst>
       <p:ext uri="{BB962C8B-B14F-4D97-AF65-F5344CB8AC3E}">
-        <p14:creationId xmlns:p14="http://schemas.microsoft.com/office/powerpoint/2010/main" val="510580806"/>
+        <p14:creationId xmlns:p14="http://schemas.microsoft.com/office/powerpoint/2010/main" val="1279870650"/>
       </p:ext>
     </p:extLst>
   </p:cSld>
@@ -6563,36 +7195,140 @@
       </p:grpSpPr>
       <p:sp>
         <p:nvSpPr>
-          <p:cNvPr id="2" name="タイトル 1"/>
+          <p:cNvPr id="3" name="コンテンツ プレースホルダー 2"/>
           <p:cNvSpPr>
             <a:spLocks noGrp="1"/>
           </p:cNvSpPr>
           <p:nvPr>
-            <p:ph type="title"/>
+            <p:ph idx="1"/>
           </p:nvPr>
         </p:nvSpPr>
         <p:spPr>
           <a:xfrm>
-            <a:off x="4354132" y="1813708"/>
-            <a:ext cx="10515600" cy="1325563"/>
+            <a:off x="493153" y="1052893"/>
+            <a:ext cx="10515600" cy="4351338"/>
           </a:xfrm>
         </p:spPr>
         <p:txBody>
           <a:bodyPr/>
           <a:lstStyle/>
           <a:p>
-            <a:r>
-              <a:rPr kumimoji="1" lang="en-US" altLang="ja-JP" dirty="0" smtClean="0"/>
-              <a:t>end</a:t>
+            <a:pPr>
+              <a:buFont typeface="Wingdings" panose="05000000000000000000" pitchFamily="2" charset="2"/>
+              <a:buChar char="Ø"/>
+            </a:pPr>
+            <a:r>
+              <a:rPr lang="en-US" altLang="ja-JP" dirty="0" smtClean="0"/>
+              <a:t> Module to fill dummy data in </a:t>
+            </a:r>
+            <a:r>
+              <a:rPr lang="en-US" altLang="ja-JP" dirty="0" err="1" smtClean="0"/>
+              <a:t>RawCOPPER</a:t>
+            </a:r>
+            <a:endParaRPr lang="en-US" altLang="ja-JP" dirty="0" smtClean="0"/>
+          </a:p>
+          <a:p>
+            <a:pPr marL="0" indent="0">
+              <a:buNone/>
+            </a:pPr>
+            <a:r>
+              <a:rPr lang="en-US" altLang="ja-JP" dirty="0" smtClean="0"/>
+              <a:t>- rawdata/modules/src/DummyDataPacker.cc</a:t>
+            </a:r>
+          </a:p>
+          <a:p>
+            <a:pPr marL="0" indent="0">
+              <a:buNone/>
+            </a:pPr>
+            <a:endParaRPr lang="en-US" altLang="ja-JP" dirty="0"/>
+          </a:p>
+          <a:p>
+            <a:pPr>
+              <a:buFont typeface="Wingdings" panose="05000000000000000000" pitchFamily="2" charset="2"/>
+              <a:buChar char="Ø"/>
+            </a:pPr>
+            <a:r>
+              <a:rPr lang="en-US" altLang="ja-JP" dirty="0" smtClean="0"/>
+              <a:t> Script to run the above module</a:t>
+            </a:r>
+          </a:p>
+          <a:p>
+            <a:pPr marL="0" indent="0">
+              <a:buNone/>
+            </a:pPr>
+            <a:r>
+              <a:rPr lang="en-US" altLang="ja-JP" dirty="0" smtClean="0"/>
+              <a:t>- $ </a:t>
+            </a:r>
+            <a:r>
+              <a:rPr lang="en-US" altLang="ja-JP" dirty="0"/>
+              <a:t>rawdata/scripts/DummyDataPacker.py</a:t>
             </a:r>
             <a:endParaRPr kumimoji="1" lang="ja-JP" altLang="en-US" dirty="0"/>
+          </a:p>
+        </p:txBody>
+      </p:sp>
+      <p:sp>
+        <p:nvSpPr>
+          <p:cNvPr id="4" name="タイトル 1"/>
+          <p:cNvSpPr txBox="1">
+            <a:spLocks/>
+          </p:cNvSpPr>
+          <p:nvPr/>
+        </p:nvSpPr>
+        <p:spPr>
+          <a:xfrm>
+            <a:off x="91371" y="0"/>
+            <a:ext cx="11319165" cy="771771"/>
+          </a:xfrm>
+          <a:prstGeom prst="rect">
+            <a:avLst/>
+          </a:prstGeom>
+        </p:spPr>
+        <p:txBody>
+          <a:bodyPr vert="horz" lIns="91440" tIns="45720" rIns="91440" bIns="45720" rtlCol="0" anchor="ctr">
+            <a:normAutofit fontScale="92500"/>
+          </a:bodyPr>
+          <a:lstStyle>
+            <a:lvl1pPr algn="l" defTabSz="914400" rtl="0" eaLnBrk="1" latinLnBrk="0" hangingPunct="1">
+              <a:lnSpc>
+                <a:spcPct val="90000"/>
+              </a:lnSpc>
+              <a:spcBef>
+                <a:spcPct val="0"/>
+              </a:spcBef>
+              <a:buNone/>
+              <a:defRPr kumimoji="1" sz="4400" kern="1200">
+                <a:solidFill>
+                  <a:schemeClr val="tx1"/>
+                </a:solidFill>
+                <a:latin typeface="+mj-lt"/>
+                <a:ea typeface="+mj-ea"/>
+                <a:cs typeface="+mj-cs"/>
+              </a:defRPr>
+            </a:lvl1pPr>
+          </a:lstStyle>
+          <a:p>
+            <a:r>
+              <a:rPr lang="en-US" altLang="ja-JP" u="sng" dirty="0" smtClean="0"/>
+              <a:t>2-2, test program to store data in </a:t>
+            </a:r>
+            <a:r>
+              <a:rPr lang="en-US" altLang="ja-JP" u="sng" dirty="0" err="1" smtClean="0"/>
+              <a:t>RawCOPPER</a:t>
+            </a:r>
+            <a:r>
+              <a:rPr lang="en-US" altLang="ja-JP" u="sng" dirty="0" smtClean="0"/>
+              <a:t> object</a:t>
+            </a:r>
+            <a:endParaRPr lang="ja-JP" altLang="en-US" u="sng" dirty="0"/>
           </a:p>
         </p:txBody>
       </p:sp>
     </p:spTree>
     <p:extLst>
       <p:ext uri="{BB962C8B-B14F-4D97-AF65-F5344CB8AC3E}">
-        <p14:creationId xmlns:p14="http://schemas.microsoft.com/office/powerpoint/2010/main" val="2620783258"/>
+        <p14:creationId xmlns:p14="http://schemas.microsoft.com/office/powerpoint/2010/main" val="510580806"/>
       </p:ext>
     </p:extLst>
   </p:cSld>
@@ -6629,37 +7365,19 @@
             <p:ph type="title"/>
           </p:nvPr>
         </p:nvSpPr>
-        <p:spPr/>
+        <p:spPr>
+          <a:xfrm>
+            <a:off x="4354132" y="1813708"/>
+            <a:ext cx="10515600" cy="1325563"/>
+          </a:xfrm>
+        </p:spPr>
         <p:txBody>
           <a:bodyPr/>
           <a:lstStyle/>
           <a:p>
             <a:r>
               <a:rPr kumimoji="1" lang="en-US" altLang="ja-JP" dirty="0" smtClean="0"/>
-              <a:t>Revision history</a:t>
-            </a:r>
-            <a:endParaRPr kumimoji="1" lang="ja-JP" altLang="en-US" dirty="0"/>
-          </a:p>
-        </p:txBody>
-      </p:sp>
-      <p:sp>
-        <p:nvSpPr>
-          <p:cNvPr id="3" name="コンテンツ プレースホルダー 2"/>
-          <p:cNvSpPr>
-            <a:spLocks noGrp="1"/>
-          </p:cNvSpPr>
-          <p:nvPr>
-            <p:ph idx="1"/>
-          </p:nvPr>
-        </p:nvSpPr>
-        <p:spPr/>
-        <p:txBody>
-          <a:bodyPr/>
-          <a:lstStyle/>
-          <a:p>
-            <a:r>
-              <a:rPr kumimoji="1" lang="en-US" altLang="ja-JP" dirty="0" smtClean="0"/>
-              <a:t>July 15, 2014  (rev.11616) : ver.1 </a:t>
+              <a:t>end</a:t>
             </a:r>
             <a:endParaRPr kumimoji="1" lang="ja-JP" altLang="en-US" dirty="0"/>
           </a:p>
@@ -6668,7 +7386,7 @@
     </p:spTree>
     <p:extLst>
       <p:ext uri="{BB962C8B-B14F-4D97-AF65-F5344CB8AC3E}">
-        <p14:creationId xmlns:p14="http://schemas.microsoft.com/office/powerpoint/2010/main" val="3152965117"/>
+        <p14:creationId xmlns:p14="http://schemas.microsoft.com/office/powerpoint/2010/main" val="2620783258"/>
       </p:ext>
     </p:extLst>
   </p:cSld>

</xml_diff>

<commit_message>
Update instruction about Packer
git-svn-id: https://belle2.cc.kek.jp/svn/trunk/software@14322 b38c6c8f-bee8-465d-8448-9abe6915d496
</commit_message>
<xml_diff>
--- a/daq/copper/doc/SetupPocketDAQ_4p5_RawDataUnpackerPacker.pptx
+++ b/daq/copper/doc/SetupPocketDAQ_4p5_RawDataUnpackerPacker.pptx
@@ -13,8 +13,9 @@
     <p:sldId id="260" r:id="rId7"/>
     <p:sldId id="261" r:id="rId8"/>
     <p:sldId id="262" r:id="rId9"/>
-    <p:sldId id="263" r:id="rId10"/>
-    <p:sldId id="264" r:id="rId11"/>
+    <p:sldId id="266" r:id="rId10"/>
+    <p:sldId id="263" r:id="rId11"/>
+    <p:sldId id="264" r:id="rId12"/>
   </p:sldIdLst>
   <p:sldSz cx="12192000" cy="6858000"/>
   <p:notesSz cx="6858000" cy="9144000"/>
@@ -252,7 +253,7 @@
           <a:p>
             <a:fld id="{7C5129ED-FA21-4495-B7FB-D7C185F19D83}" type="datetimeFigureOut">
               <a:rPr kumimoji="1" lang="ja-JP" altLang="en-US" smtClean="0"/>
-              <a:t>2014/8/8</a:t>
+              <a:t>2014/12/5</a:t>
             </a:fld>
             <a:endParaRPr kumimoji="1" lang="ja-JP" altLang="en-US"/>
           </a:p>
@@ -454,7 +455,7 @@
           <a:p>
             <a:fld id="{7C5129ED-FA21-4495-B7FB-D7C185F19D83}" type="datetimeFigureOut">
               <a:rPr kumimoji="1" lang="ja-JP" altLang="en-US" smtClean="0"/>
-              <a:t>2014/8/8</a:t>
+              <a:t>2014/12/5</a:t>
             </a:fld>
             <a:endParaRPr kumimoji="1" lang="ja-JP" altLang="en-US"/>
           </a:p>
@@ -666,7 +667,7 @@
           <a:p>
             <a:fld id="{7C5129ED-FA21-4495-B7FB-D7C185F19D83}" type="datetimeFigureOut">
               <a:rPr kumimoji="1" lang="ja-JP" altLang="en-US" smtClean="0"/>
-              <a:t>2014/8/8</a:t>
+              <a:t>2014/12/5</a:t>
             </a:fld>
             <a:endParaRPr kumimoji="1" lang="ja-JP" altLang="en-US"/>
           </a:p>
@@ -868,7 +869,7 @@
           <a:p>
             <a:fld id="{7C5129ED-FA21-4495-B7FB-D7C185F19D83}" type="datetimeFigureOut">
               <a:rPr kumimoji="1" lang="ja-JP" altLang="en-US" smtClean="0"/>
-              <a:t>2014/8/8</a:t>
+              <a:t>2014/12/5</a:t>
             </a:fld>
             <a:endParaRPr kumimoji="1" lang="ja-JP" altLang="en-US"/>
           </a:p>
@@ -1114,7 +1115,7 @@
           <a:p>
             <a:fld id="{7C5129ED-FA21-4495-B7FB-D7C185F19D83}" type="datetimeFigureOut">
               <a:rPr kumimoji="1" lang="ja-JP" altLang="en-US" smtClean="0"/>
-              <a:t>2014/8/8</a:t>
+              <a:t>2014/12/5</a:t>
             </a:fld>
             <a:endParaRPr kumimoji="1" lang="ja-JP" altLang="en-US"/>
           </a:p>
@@ -1410,7 +1411,7 @@
           <a:p>
             <a:fld id="{7C5129ED-FA21-4495-B7FB-D7C185F19D83}" type="datetimeFigureOut">
               <a:rPr kumimoji="1" lang="ja-JP" altLang="en-US" smtClean="0"/>
-              <a:t>2014/8/8</a:t>
+              <a:t>2014/12/5</a:t>
             </a:fld>
             <a:endParaRPr kumimoji="1" lang="ja-JP" altLang="en-US"/>
           </a:p>
@@ -1841,7 +1842,7 @@
           <a:p>
             <a:fld id="{7C5129ED-FA21-4495-B7FB-D7C185F19D83}" type="datetimeFigureOut">
               <a:rPr kumimoji="1" lang="ja-JP" altLang="en-US" smtClean="0"/>
-              <a:t>2014/8/8</a:t>
+              <a:t>2014/12/5</a:t>
             </a:fld>
             <a:endParaRPr kumimoji="1" lang="ja-JP" altLang="en-US"/>
           </a:p>
@@ -1959,7 +1960,7 @@
           <a:p>
             <a:fld id="{7C5129ED-FA21-4495-B7FB-D7C185F19D83}" type="datetimeFigureOut">
               <a:rPr kumimoji="1" lang="ja-JP" altLang="en-US" smtClean="0"/>
-              <a:t>2014/8/8</a:t>
+              <a:t>2014/12/5</a:t>
             </a:fld>
             <a:endParaRPr kumimoji="1" lang="ja-JP" altLang="en-US"/>
           </a:p>
@@ -2054,7 +2055,7 @@
           <a:p>
             <a:fld id="{7C5129ED-FA21-4495-B7FB-D7C185F19D83}" type="datetimeFigureOut">
               <a:rPr kumimoji="1" lang="ja-JP" altLang="en-US" smtClean="0"/>
-              <a:t>2014/8/8</a:t>
+              <a:t>2014/12/5</a:t>
             </a:fld>
             <a:endParaRPr kumimoji="1" lang="ja-JP" altLang="en-US"/>
           </a:p>
@@ -2363,7 +2364,7 @@
           <a:p>
             <a:fld id="{7C5129ED-FA21-4495-B7FB-D7C185F19D83}" type="datetimeFigureOut">
               <a:rPr kumimoji="1" lang="ja-JP" altLang="en-US" smtClean="0"/>
-              <a:t>2014/8/8</a:t>
+              <a:t>2014/12/5</a:t>
             </a:fld>
             <a:endParaRPr kumimoji="1" lang="ja-JP" altLang="en-US"/>
           </a:p>
@@ -2616,7 +2617,7 @@
           <a:p>
             <a:fld id="{7C5129ED-FA21-4495-B7FB-D7C185F19D83}" type="datetimeFigureOut">
               <a:rPr kumimoji="1" lang="ja-JP" altLang="en-US" smtClean="0"/>
-              <a:t>2014/8/8</a:t>
+              <a:t>2014/12/5</a:t>
             </a:fld>
             <a:endParaRPr kumimoji="1" lang="ja-JP" altLang="en-US"/>
           </a:p>
@@ -2861,7 +2862,7 @@
           <a:p>
             <a:fld id="{7C5129ED-FA21-4495-B7FB-D7C185F19D83}" type="datetimeFigureOut">
               <a:rPr kumimoji="1" lang="ja-JP" altLang="en-US" smtClean="0"/>
-              <a:t>2014/8/8</a:t>
+              <a:t>2014/12/5</a:t>
             </a:fld>
             <a:endParaRPr kumimoji="1" lang="ja-JP" altLang="en-US"/>
           </a:p>
@@ -3316,8 +3317,12 @@
           <a:lstStyle/>
           <a:p>
             <a:r>
+              <a:rPr lang="en-US" altLang="ja-JP" sz="2400" dirty="0" smtClean="0"/>
+              <a:t>Dec. 5</a:t>
+            </a:r>
+            <a:r>
               <a:rPr kumimoji="1" lang="en-US" altLang="ja-JP" sz="2400" dirty="0" smtClean="0"/>
-              <a:t>Aug. 8, </a:t>
+              <a:t>, </a:t>
             </a:r>
             <a:r>
               <a:rPr kumimoji="1" lang="en-US" altLang="ja-JP" sz="2400" dirty="0" smtClean="0"/>
@@ -3329,7 +3334,11 @@
             </a:r>
             <a:r>
               <a:rPr lang="en-US" altLang="ja-JP" sz="2400" dirty="0" smtClean="0"/>
-              <a:t>rev. 12158)</a:t>
+              <a:t>rev. </a:t>
+            </a:r>
+            <a:r>
+              <a:rPr lang="en-US" altLang="ja-JP" sz="2400" dirty="0" smtClean="0"/>
+              <a:t>14322)</a:t>
             </a:r>
             <a:endParaRPr lang="ja-JP" altLang="en-US" sz="2400" dirty="0"/>
           </a:p>
@@ -3387,6 +3396,64 @@
         </p:nvSpPr>
         <p:spPr>
           <a:xfrm>
+            <a:off x="4354132" y="1813708"/>
+            <a:ext cx="10515600" cy="1325563"/>
+          </a:xfrm>
+        </p:spPr>
+        <p:txBody>
+          <a:bodyPr/>
+          <a:lstStyle/>
+          <a:p>
+            <a:r>
+              <a:rPr kumimoji="1" lang="en-US" altLang="ja-JP" dirty="0" smtClean="0"/>
+              <a:t>end</a:t>
+            </a:r>
+            <a:endParaRPr kumimoji="1" lang="ja-JP" altLang="en-US" dirty="0"/>
+          </a:p>
+        </p:txBody>
+      </p:sp>
+    </p:spTree>
+    <p:extLst>
+      <p:ext uri="{BB962C8B-B14F-4D97-AF65-F5344CB8AC3E}">
+        <p14:creationId xmlns:p14="http://schemas.microsoft.com/office/powerpoint/2010/main" val="2620783258"/>
+      </p:ext>
+    </p:extLst>
+  </p:cSld>
+  <p:clrMapOvr>
+    <a:masterClrMapping/>
+  </p:clrMapOvr>
+</p:sld>
+</file>
+
+<file path=ppt/slides/slide11.xml><?xml version="1.0" encoding="utf-8"?>
+<p:sld xmlns:a="http://schemas.openxmlformats.org/drawingml/2006/main" xmlns:r="http://schemas.openxmlformats.org/officeDocument/2006/relationships" xmlns:p="http://schemas.openxmlformats.org/presentationml/2006/main">
+  <p:cSld>
+    <p:spTree>
+      <p:nvGrpSpPr>
+        <p:cNvPr id="1" name=""/>
+        <p:cNvGrpSpPr/>
+        <p:nvPr/>
+      </p:nvGrpSpPr>
+      <p:grpSpPr>
+        <a:xfrm>
+          <a:off x="0" y="0"/>
+          <a:ext cx="0" cy="0"/>
+          <a:chOff x="0" y="0"/>
+          <a:chExt cx="0" cy="0"/>
+        </a:xfrm>
+      </p:grpSpPr>
+      <p:sp>
+        <p:nvSpPr>
+          <p:cNvPr id="2" name="タイトル 1"/>
+          <p:cNvSpPr>
+            <a:spLocks noGrp="1"/>
+          </p:cNvSpPr>
+          <p:nvPr>
+            <p:ph type="title"/>
+          </p:nvPr>
+        </p:nvSpPr>
+        <p:spPr>
+          <a:xfrm>
             <a:off x="412173" y="114300"/>
             <a:ext cx="10515600" cy="828243"/>
           </a:xfrm>
@@ -3420,17 +3487,8 @@
           <a:p>
             <a:r>
               <a:rPr kumimoji="1" lang="en-US" altLang="ja-JP" dirty="0" smtClean="0"/>
-              <a:t>July 15, </a:t>
-            </a:r>
-            <a:r>
-              <a:rPr kumimoji="1" lang="en-US" altLang="ja-JP" dirty="0" smtClean="0"/>
-              <a:t>2014 </a:t>
-            </a:r>
-            <a:r>
-              <a:rPr kumimoji="1" lang="en-US" altLang="ja-JP" dirty="0" smtClean="0"/>
-              <a:t>(rev.11616) : ver.1 </a:t>
-            </a:r>
-            <a:endParaRPr kumimoji="1" lang="en-US" altLang="ja-JP" dirty="0" smtClean="0"/>
+              <a:t>July 15, 2014 (rev.11616) : ver.1 </a:t>
+            </a:r>
           </a:p>
           <a:p>
             <a:r>
@@ -3442,7 +3500,59 @@
             <a:pPr lvl="1"/>
             <a:r>
               <a:rPr kumimoji="1" lang="en-US" altLang="ja-JP" dirty="0" smtClean="0"/>
-              <a:t>Add instruction about setting a buffer to Raw*** object.</a:t>
+              <a:t>Add instruction about setting a buffer to Raw*** object</a:t>
+            </a:r>
+            <a:r>
+              <a:rPr kumimoji="1" lang="en-US" altLang="ja-JP" dirty="0" smtClean="0"/>
+              <a:t>.</a:t>
+            </a:r>
+          </a:p>
+          <a:p>
+            <a:r>
+              <a:rPr kumimoji="1" lang="en-US" altLang="ja-JP" dirty="0" smtClean="0"/>
+              <a:t>Dec. 5, 2014 (rev. 14322)</a:t>
+            </a:r>
+          </a:p>
+          <a:p>
+            <a:pPr lvl="1"/>
+            <a:r>
+              <a:rPr lang="en-US" altLang="ja-JP" dirty="0" smtClean="0"/>
+              <a:t>Modify to produce multiple COPPER events</a:t>
+            </a:r>
+          </a:p>
+          <a:p>
+            <a:pPr lvl="1"/>
+            <a:r>
+              <a:rPr lang="en-US" altLang="ja-JP" dirty="0" smtClean="0"/>
+              <a:t>Use </a:t>
+            </a:r>
+            <a:r>
+              <a:rPr lang="en-US" altLang="ja-JP" dirty="0" err="1" smtClean="0"/>
+              <a:t>RawSVD</a:t>
+            </a:r>
+            <a:r>
+              <a:rPr lang="en-US" altLang="ja-JP" dirty="0" smtClean="0"/>
+              <a:t> instead of </a:t>
+            </a:r>
+            <a:r>
+              <a:rPr lang="en-US" altLang="ja-JP" dirty="0" err="1" smtClean="0"/>
+              <a:t>RawCOPPER</a:t>
+            </a:r>
+            <a:endParaRPr lang="en-US" altLang="ja-JP" dirty="0" smtClean="0"/>
+          </a:p>
+          <a:p>
+            <a:pPr lvl="1"/>
+            <a:r>
+              <a:rPr lang="en-US" altLang="ja-JP" dirty="0" smtClean="0"/>
+              <a:t>As a result, </a:t>
+            </a:r>
+            <a:r>
+              <a:rPr lang="en-US" altLang="ja-JP" dirty="0" err="1" smtClean="0"/>
+              <a:t>m_nodeid</a:t>
+            </a:r>
+            <a:r>
+              <a:rPr lang="en-US" altLang="ja-JP" dirty="0" smtClean="0"/>
+              <a:t> in DummyDataPacker.cc should be hard-coded.</a:t>
             </a:r>
             <a:endParaRPr kumimoji="1" lang="ja-JP" altLang="en-US" dirty="0"/>
           </a:p>
@@ -6173,26 +6283,40 @@
         <p:spPr>
           <a:xfrm>
             <a:off x="91371" y="0"/>
-            <a:ext cx="11319165" cy="771771"/>
+            <a:ext cx="11891363" cy="771771"/>
           </a:xfrm>
         </p:spPr>
         <p:txBody>
-          <a:bodyPr/>
+          <a:bodyPr>
+            <a:noAutofit/>
+          </a:bodyPr>
           <a:lstStyle/>
           <a:p>
             <a:r>
-              <a:rPr lang="en-US" altLang="ja-JP" u="sng" dirty="0" smtClean="0"/>
+              <a:rPr lang="en-US" altLang="ja-JP" sz="3200" u="sng" dirty="0" smtClean="0"/>
               <a:t>2-1, Function to store data in </a:t>
             </a:r>
             <a:r>
-              <a:rPr lang="en-US" altLang="ja-JP" u="sng" dirty="0" err="1" smtClean="0"/>
-              <a:t>RawCOPPER</a:t>
-            </a:r>
-            <a:r>
-              <a:rPr lang="en-US" altLang="ja-JP" u="sng" dirty="0" smtClean="0"/>
-              <a:t> object</a:t>
-            </a:r>
-            <a:endParaRPr kumimoji="1" lang="ja-JP" altLang="en-US" u="sng" dirty="0"/>
+              <a:rPr lang="en-US" altLang="ja-JP" sz="3200" u="sng" dirty="0" err="1" smtClean="0"/>
+              <a:t>RawSVD</a:t>
+            </a:r>
+            <a:r>
+              <a:rPr lang="en-US" altLang="ja-JP" sz="3200" u="sng" dirty="0" smtClean="0"/>
+              <a:t>(or other </a:t>
+            </a:r>
+            <a:r>
+              <a:rPr lang="en-US" altLang="ja-JP" sz="3200" u="sng" dirty="0" err="1" smtClean="0"/>
+              <a:t>RawDetector</a:t>
+            </a:r>
+            <a:r>
+              <a:rPr lang="en-US" altLang="ja-JP" sz="3200" u="sng" dirty="0" smtClean="0"/>
+              <a:t> ) </a:t>
+            </a:r>
+            <a:r>
+              <a:rPr lang="en-US" altLang="ja-JP" sz="3200" u="sng" dirty="0" smtClean="0"/>
+              <a:t>object</a:t>
+            </a:r>
+            <a:endParaRPr kumimoji="1" lang="ja-JP" altLang="en-US" sz="3200" u="sng" dirty="0"/>
           </a:p>
         </p:txBody>
       </p:sp>
@@ -6554,7 +6678,7 @@
         </p:nvSpPr>
         <p:spPr>
           <a:xfrm>
-            <a:off x="5750953" y="3085588"/>
+            <a:off x="5750953" y="2949238"/>
             <a:ext cx="6096000" cy="3539430"/>
           </a:xfrm>
           <a:prstGeom prst="rect">
@@ -7223,7 +7347,7 @@
             </a:r>
             <a:r>
               <a:rPr lang="en-US" altLang="ja-JP" dirty="0" err="1" smtClean="0"/>
-              <a:t>RawCOPPER</a:t>
+              <a:t>RawSVD</a:t>
             </a:r>
             <a:endParaRPr lang="en-US" altLang="ja-JP" dirty="0" smtClean="0"/>
           </a:p>
@@ -7279,7 +7403,7 @@
         <p:spPr>
           <a:xfrm>
             <a:off x="91371" y="0"/>
-            <a:ext cx="11319165" cy="771771"/>
+            <a:ext cx="11795829" cy="771771"/>
           </a:xfrm>
           <a:prstGeom prst="rect">
             <a:avLst/>
@@ -7287,7 +7411,7 @@
         </p:spPr>
         <p:txBody>
           <a:bodyPr vert="horz" lIns="91440" tIns="45720" rIns="91440" bIns="45720" rtlCol="0" anchor="ctr">
-            <a:normAutofit fontScale="92500"/>
+            <a:normAutofit fontScale="70000" lnSpcReduction="20000"/>
           </a:bodyPr>
           <a:lstStyle>
             <a:lvl1pPr algn="l" defTabSz="914400" rtl="0" eaLnBrk="1" latinLnBrk="0" hangingPunct="1">
@@ -7314,12 +7438,24 @@
               <a:t>2-2, test program to store data in </a:t>
             </a:r>
             <a:r>
-              <a:rPr lang="en-US" altLang="ja-JP" u="sng" dirty="0" err="1" smtClean="0"/>
-              <a:t>RawCOPPER</a:t>
+              <a:rPr lang="en-US" altLang="ja-JP" u="sng" dirty="0" err="1"/>
+              <a:t>RawSVD</a:t>
+            </a:r>
+            <a:r>
+              <a:rPr lang="en-US" altLang="ja-JP" u="sng" dirty="0"/>
+              <a:t>(or other </a:t>
+            </a:r>
+            <a:r>
+              <a:rPr lang="en-US" altLang="ja-JP" u="sng" dirty="0" err="1"/>
+              <a:t>RawDetector</a:t>
+            </a:r>
+            <a:r>
+              <a:rPr lang="en-US" altLang="ja-JP" u="sng" dirty="0"/>
+              <a:t> ) </a:t>
             </a:r>
             <a:r>
               <a:rPr lang="en-US" altLang="ja-JP" u="sng" dirty="0" smtClean="0"/>
-              <a:t> object</a:t>
+              <a:t>object</a:t>
             </a:r>
             <a:endParaRPr lang="ja-JP" altLang="en-US" u="sng" dirty="0"/>
           </a:p>
@@ -7367,7 +7503,7 @@
         </p:nvSpPr>
         <p:spPr>
           <a:xfrm>
-            <a:off x="4354132" y="1813708"/>
+            <a:off x="128516" y="-33645"/>
             <a:ext cx="10515600" cy="1325563"/>
           </a:xfrm>
         </p:spPr>
@@ -7376,17 +7512,251 @@
           <a:lstStyle/>
           <a:p>
             <a:r>
-              <a:rPr kumimoji="1" lang="en-US" altLang="ja-JP" dirty="0" smtClean="0"/>
-              <a:t>end</a:t>
-            </a:r>
-            <a:endParaRPr kumimoji="1" lang="ja-JP" altLang="en-US" dirty="0"/>
+              <a:rPr lang="en-US" altLang="ja-JP" u="sng" dirty="0" smtClean="0"/>
+              <a:t>Example of packed data</a:t>
+            </a:r>
+            <a:endParaRPr kumimoji="1" lang="ja-JP" altLang="en-US" u="sng" dirty="0"/>
+          </a:p>
+        </p:txBody>
+      </p:sp>
+      <p:sp>
+        <p:nvSpPr>
+          <p:cNvPr id="4" name="正方形/長方形 3"/>
+          <p:cNvSpPr/>
+          <p:nvPr/>
+        </p:nvSpPr>
+        <p:spPr>
+          <a:xfrm>
+            <a:off x="838200" y="1477526"/>
+            <a:ext cx="8798257" cy="5047536"/>
+          </a:xfrm>
+          <a:prstGeom prst="rect">
+            <a:avLst/>
+          </a:prstGeom>
+        </p:spPr>
+        <p:txBody>
+          <a:bodyPr wrap="square">
+            <a:spAutoFit/>
+          </a:bodyPr>
+          <a:lstStyle/>
+          <a:p>
+            <a:r>
+              <a:rPr lang="en-US" altLang="ja-JP" sz="1400" dirty="0"/>
+              <a:t>===== </a:t>
+            </a:r>
+            <a:r>
+              <a:rPr lang="en-US" altLang="ja-JP" sz="1400" dirty="0" err="1"/>
+              <a:t>DataBlock</a:t>
+            </a:r>
+            <a:r>
+              <a:rPr lang="en-US" altLang="ja-JP" sz="1400" dirty="0"/>
+              <a:t>(</a:t>
+            </a:r>
+            <a:r>
+              <a:rPr lang="en-US" altLang="ja-JP" sz="1400" dirty="0" err="1"/>
+              <a:t>RawSVD</a:t>
+            </a:r>
+            <a:r>
+              <a:rPr lang="en-US" altLang="ja-JP" sz="1400" dirty="0"/>
+              <a:t>) : Block # 38</a:t>
+            </a:r>
+          </a:p>
+          <a:p>
+            <a:r>
+              <a:rPr lang="en-US" altLang="ja-JP" sz="1400" dirty="0"/>
+              <a:t>: Event # 3 : node ID 0x0100040e : block size 168 bytes</a:t>
+            </a:r>
+          </a:p>
+          <a:p>
+            <a:r>
+              <a:rPr lang="en-US" altLang="ja-JP" sz="1400" dirty="0"/>
+              <a:t> 0000002a 7f7f010c 00400002 00000003 71234560 f1234567 0100040e 00000000 0000000c 00000012</a:t>
+            </a:r>
+          </a:p>
+          <a:p>
+            <a:r>
+              <a:rPr lang="en-US" altLang="ja-JP" sz="1400" dirty="0"/>
+              <a:t> 00000019 00000021 ffaa0003 16543210 00000000 00000001 00000002 00030000 ffaa0003 16543210</a:t>
+            </a:r>
+          </a:p>
+          <a:p>
+            <a:r>
+              <a:rPr lang="en-US" altLang="ja-JP" sz="1400" dirty="0"/>
+              <a:t> 00000001 00000002 00000003 00000004 00030000 ffaa0003 16543210 00000002 00000003 00000004</a:t>
+            </a:r>
+          </a:p>
+          <a:p>
+            <a:r>
+              <a:rPr lang="en-US" altLang="ja-JP" sz="1400" dirty="0"/>
+              <a:t> 00000005 00000006 00030000 ffaa0003 16543210 00000003 00000004 00000005 00000006 00030000</a:t>
+            </a:r>
+          </a:p>
+          <a:p>
+            <a:r>
+              <a:rPr lang="en-US" altLang="ja-JP" sz="1400" dirty="0"/>
+              <a:t> 00000000 7fff0006</a:t>
+            </a:r>
+          </a:p>
+          <a:p>
+            <a:r>
+              <a:rPr lang="en-US" altLang="ja-JP" sz="1400" dirty="0"/>
+              <a:t>===== FINESSE Buffer(FINESSE A) 0x3 words </a:t>
+            </a:r>
+          </a:p>
+          <a:p>
+            <a:r>
+              <a:rPr lang="en-US" altLang="ja-JP" sz="1400" dirty="0"/>
+              <a:t> ffaa0003 16543210 00000000 00000001 00000002 00030000</a:t>
+            </a:r>
+          </a:p>
+          <a:p>
+            <a:r>
+              <a:rPr lang="en-US" altLang="ja-JP" sz="1400" dirty="0"/>
+              <a:t>===== Detector Buffer(FINESSE A) 0x3 words </a:t>
+            </a:r>
+          </a:p>
+          <a:p>
+            <a:r>
+              <a:rPr lang="en-US" altLang="ja-JP" sz="1400" dirty="0"/>
+              <a:t> </a:t>
+            </a:r>
+            <a:r>
+              <a:rPr lang="en-US" altLang="ja-JP" sz="1400" dirty="0">
+                <a:solidFill>
+                  <a:srgbClr val="FF0000"/>
+                </a:solidFill>
+              </a:rPr>
+              <a:t>00000000 00000001 00000002</a:t>
+            </a:r>
+          </a:p>
+          <a:p>
+            <a:r>
+              <a:rPr lang="en-US" altLang="ja-JP" sz="1400" dirty="0"/>
+              <a:t>===== FINESSE Buffer(FINESSE B) 0x3 words </a:t>
+            </a:r>
+          </a:p>
+          <a:p>
+            <a:r>
+              <a:rPr lang="en-US" altLang="ja-JP" sz="1400" dirty="0"/>
+              <a:t> ffaa0003 16543210 00000001 00000002 00000003 00000004 00030000</a:t>
+            </a:r>
+          </a:p>
+          <a:p>
+            <a:r>
+              <a:rPr lang="en-US" altLang="ja-JP" sz="1400" dirty="0"/>
+              <a:t>===== Detector Buffer(FINESSE B) 0x4 words </a:t>
+            </a:r>
+          </a:p>
+          <a:p>
+            <a:r>
+              <a:rPr lang="en-US" altLang="ja-JP" sz="1400" dirty="0">
+                <a:solidFill>
+                  <a:srgbClr val="FF0000"/>
+                </a:solidFill>
+              </a:rPr>
+              <a:t> 00000001 00000002 00000003 00000004</a:t>
+            </a:r>
+          </a:p>
+          <a:p>
+            <a:r>
+              <a:rPr lang="en-US" altLang="ja-JP" sz="1400" dirty="0"/>
+              <a:t>===== FINESSE Buffer(FINESSE C) 0x3 words </a:t>
+            </a:r>
+          </a:p>
+          <a:p>
+            <a:r>
+              <a:rPr lang="en-US" altLang="ja-JP" sz="1400" dirty="0"/>
+              <a:t> ffaa0003 16543210 00000002 00000003 00000004 00000005 00000006 00030000</a:t>
+            </a:r>
+          </a:p>
+          <a:p>
+            <a:r>
+              <a:rPr lang="en-US" altLang="ja-JP" sz="1400" dirty="0"/>
+              <a:t>===== Detector Buffer(FINESSE C) 0x5 words </a:t>
+            </a:r>
+          </a:p>
+          <a:p>
+            <a:r>
+              <a:rPr lang="en-US" altLang="ja-JP" sz="1400" dirty="0">
+                <a:solidFill>
+                  <a:srgbClr val="FF0000"/>
+                </a:solidFill>
+              </a:rPr>
+              <a:t> 00000002 00000003 00000004 00000005 00000006</a:t>
+            </a:r>
+          </a:p>
+          <a:p>
+            <a:r>
+              <a:rPr lang="en-US" altLang="ja-JP" sz="1400" dirty="0"/>
+              <a:t>===== FINESSE Buffer(FINESSE D) 0x3 words </a:t>
+            </a:r>
+          </a:p>
+          <a:p>
+            <a:r>
+              <a:rPr lang="en-US" altLang="ja-JP" sz="1400" dirty="0"/>
+              <a:t> ffaa0003 16543210 00000003 00000004 00000005 00000006 00030000</a:t>
+            </a:r>
+          </a:p>
+          <a:p>
+            <a:r>
+              <a:rPr lang="en-US" altLang="ja-JP" sz="1400" dirty="0"/>
+              <a:t>===== Detector Buffer(FINESSE D) 0x4 words </a:t>
+            </a:r>
+          </a:p>
+          <a:p>
+            <a:r>
+              <a:rPr lang="en-US" altLang="ja-JP" sz="1400" dirty="0">
+                <a:solidFill>
+                  <a:srgbClr val="FF0000"/>
+                </a:solidFill>
+              </a:rPr>
+              <a:t> 00000003 00000004 00000005 00000006</a:t>
+            </a:r>
+          </a:p>
+        </p:txBody>
+      </p:sp>
+      <p:sp>
+        <p:nvSpPr>
+          <p:cNvPr id="5" name="テキスト ボックス 4"/>
+          <p:cNvSpPr txBox="1"/>
+          <p:nvPr/>
+        </p:nvSpPr>
+        <p:spPr>
+          <a:xfrm>
+            <a:off x="7560860" y="736979"/>
+            <a:ext cx="2275431" cy="369332"/>
+          </a:xfrm>
+          <a:prstGeom prst="rect">
+            <a:avLst/>
+          </a:prstGeom>
+          <a:noFill/>
+        </p:spPr>
+        <p:txBody>
+          <a:bodyPr wrap="none" rtlCol="0">
+            <a:spAutoFit/>
+          </a:bodyPr>
+          <a:lstStyle/>
+          <a:p>
+            <a:r>
+              <a:rPr kumimoji="1" lang="en-US" altLang="ja-JP" dirty="0" smtClean="0">
+                <a:solidFill>
+                  <a:srgbClr val="FF0000"/>
+                </a:solidFill>
+              </a:rPr>
+              <a:t>Red : detector buffers </a:t>
+            </a:r>
+            <a:endParaRPr kumimoji="1" lang="ja-JP" altLang="en-US" dirty="0">
+              <a:solidFill>
+                <a:srgbClr val="FF0000"/>
+              </a:solidFill>
+            </a:endParaRPr>
           </a:p>
         </p:txBody>
       </p:sp>
     </p:spTree>
     <p:extLst>
       <p:ext uri="{BB962C8B-B14F-4D97-AF65-F5344CB8AC3E}">
-        <p14:creationId xmlns:p14="http://schemas.microsoft.com/office/powerpoint/2010/main" val="2620783258"/>
+        <p14:creationId xmlns:p14="http://schemas.microsoft.com/office/powerpoint/2010/main" val="898796484"/>
       </p:ext>
     </p:extLst>
   </p:cSld>

</xml_diff>